<commit_message>
add sample code for analyzing with KNN and SVN
</commit_message>
<xml_diff>
--- a/Analysis_Origine_Wine/Report.pptx
+++ b/Analysis_Origine_Wine/Report.pptx
@@ -33,6 +33,20 @@
     <p:sldId id="283" r:id="rId27"/>
     <p:sldId id="284" r:id="rId28"/>
     <p:sldId id="285" r:id="rId29"/>
+    <p:sldId id="288" r:id="rId30"/>
+    <p:sldId id="293" r:id="rId31"/>
+    <p:sldId id="292" r:id="rId32"/>
+    <p:sldId id="297" r:id="rId33"/>
+    <p:sldId id="294" r:id="rId34"/>
+    <p:sldId id="289" r:id="rId35"/>
+    <p:sldId id="295" r:id="rId36"/>
+    <p:sldId id="291" r:id="rId37"/>
+    <p:sldId id="296" r:id="rId38"/>
+    <p:sldId id="298" r:id="rId39"/>
+    <p:sldId id="299" r:id="rId40"/>
+    <p:sldId id="290" r:id="rId41"/>
+    <p:sldId id="286" r:id="rId42"/>
+    <p:sldId id="287" r:id="rId43"/>
   </p:sldIdLst>
   <p:sldSz cx="12192000" cy="6858000"/>
   <p:notesSz cx="6858000" cy="9144000"/>
@@ -286,7 +300,7 @@
           <a:p>
             <a:fld id="{DEECFFD5-7A88-4759-9EDD-B85309770726}" type="datetimeFigureOut">
               <a:rPr kumimoji="1" lang="ja-JP" altLang="en-US" smtClean="0"/>
-              <a:t>2018/8/25</a:t>
+              <a:t>2018/10/17</a:t>
             </a:fld>
             <a:endParaRPr kumimoji="1" lang="ja-JP" altLang="en-US"/>
           </a:p>
@@ -516,7 +530,7 @@
           <a:p>
             <a:fld id="{DEECFFD5-7A88-4759-9EDD-B85309770726}" type="datetimeFigureOut">
               <a:rPr kumimoji="1" lang="ja-JP" altLang="en-US" smtClean="0"/>
-              <a:t>2018/8/25</a:t>
+              <a:t>2018/10/17</a:t>
             </a:fld>
             <a:endParaRPr kumimoji="1" lang="ja-JP" altLang="en-US"/>
           </a:p>
@@ -756,7 +770,7 @@
           <a:p>
             <a:fld id="{DEECFFD5-7A88-4759-9EDD-B85309770726}" type="datetimeFigureOut">
               <a:rPr kumimoji="1" lang="ja-JP" altLang="en-US" smtClean="0"/>
-              <a:t>2018/8/25</a:t>
+              <a:t>2018/10/17</a:t>
             </a:fld>
             <a:endParaRPr kumimoji="1" lang="ja-JP" altLang="en-US"/>
           </a:p>
@@ -986,7 +1000,7 @@
           <a:p>
             <a:fld id="{DEECFFD5-7A88-4759-9EDD-B85309770726}" type="datetimeFigureOut">
               <a:rPr kumimoji="1" lang="ja-JP" altLang="en-US" smtClean="0"/>
-              <a:t>2018/8/25</a:t>
+              <a:t>2018/10/17</a:t>
             </a:fld>
             <a:endParaRPr kumimoji="1" lang="ja-JP" altLang="en-US"/>
           </a:p>
@@ -1261,7 +1275,7 @@
           <a:p>
             <a:fld id="{DEECFFD5-7A88-4759-9EDD-B85309770726}" type="datetimeFigureOut">
               <a:rPr kumimoji="1" lang="ja-JP" altLang="en-US" smtClean="0"/>
-              <a:t>2018/8/25</a:t>
+              <a:t>2018/10/17</a:t>
             </a:fld>
             <a:endParaRPr kumimoji="1" lang="ja-JP" altLang="en-US"/>
           </a:p>
@@ -1590,7 +1604,7 @@
           <a:p>
             <a:fld id="{DEECFFD5-7A88-4759-9EDD-B85309770726}" type="datetimeFigureOut">
               <a:rPr kumimoji="1" lang="ja-JP" altLang="en-US" smtClean="0"/>
-              <a:t>2018/8/25</a:t>
+              <a:t>2018/10/17</a:t>
             </a:fld>
             <a:endParaRPr kumimoji="1" lang="ja-JP" altLang="en-US"/>
           </a:p>
@@ -2066,7 +2080,7 @@
           <a:p>
             <a:fld id="{DEECFFD5-7A88-4759-9EDD-B85309770726}" type="datetimeFigureOut">
               <a:rPr kumimoji="1" lang="ja-JP" altLang="en-US" smtClean="0"/>
-              <a:t>2018/8/25</a:t>
+              <a:t>2018/10/17</a:t>
             </a:fld>
             <a:endParaRPr kumimoji="1" lang="ja-JP" altLang="en-US"/>
           </a:p>
@@ -2207,7 +2221,7 @@
           <a:p>
             <a:fld id="{DEECFFD5-7A88-4759-9EDD-B85309770726}" type="datetimeFigureOut">
               <a:rPr kumimoji="1" lang="ja-JP" altLang="en-US" smtClean="0"/>
-              <a:t>2018/8/25</a:t>
+              <a:t>2018/10/17</a:t>
             </a:fld>
             <a:endParaRPr kumimoji="1" lang="ja-JP" altLang="en-US"/>
           </a:p>
@@ -2320,7 +2334,7 @@
           <a:p>
             <a:fld id="{DEECFFD5-7A88-4759-9EDD-B85309770726}" type="datetimeFigureOut">
               <a:rPr kumimoji="1" lang="ja-JP" altLang="en-US" smtClean="0"/>
-              <a:t>2018/8/25</a:t>
+              <a:t>2018/10/17</a:t>
             </a:fld>
             <a:endParaRPr kumimoji="1" lang="ja-JP" altLang="en-US"/>
           </a:p>
@@ -2663,7 +2677,7 @@
           <a:p>
             <a:fld id="{DEECFFD5-7A88-4759-9EDD-B85309770726}" type="datetimeFigureOut">
               <a:rPr kumimoji="1" lang="ja-JP" altLang="en-US" smtClean="0"/>
-              <a:t>2018/8/25</a:t>
+              <a:t>2018/10/17</a:t>
             </a:fld>
             <a:endParaRPr kumimoji="1" lang="ja-JP" altLang="en-US"/>
           </a:p>
@@ -2951,7 +2965,7 @@
           <a:p>
             <a:fld id="{DEECFFD5-7A88-4759-9EDD-B85309770726}" type="datetimeFigureOut">
               <a:rPr kumimoji="1" lang="ja-JP" altLang="en-US" smtClean="0"/>
-              <a:t>2018/8/25</a:t>
+              <a:t>2018/10/17</a:t>
             </a:fld>
             <a:endParaRPr kumimoji="1" lang="ja-JP" altLang="en-US"/>
           </a:p>
@@ -3224,7 +3238,7 @@
           <a:p>
             <a:fld id="{DEECFFD5-7A88-4759-9EDD-B85309770726}" type="datetimeFigureOut">
               <a:rPr kumimoji="1" lang="ja-JP" altLang="en-US" smtClean="0"/>
-              <a:t>2018/8/25</a:t>
+              <a:t>2018/10/17</a:t>
             </a:fld>
             <a:endParaRPr kumimoji="1" lang="ja-JP" altLang="en-US"/>
           </a:p>
@@ -5038,170 +5052,6 @@
           </a:p>
         </p:txBody>
       </p:sp>
-      <p:cxnSp>
-        <p:nvCxnSpPr>
-          <p:cNvPr id="8" name="直線コネクタ 7">
-            <a:extLst>
-              <a:ext uri="{FF2B5EF4-FFF2-40B4-BE49-F238E27FC236}">
-                <a16:creationId xmlns:a16="http://schemas.microsoft.com/office/drawing/2014/main" id="{05E40D5F-06D3-428A-95DB-77A597CBE8E9}"/>
-              </a:ext>
-            </a:extLst>
-          </p:cNvPr>
-          <p:cNvCxnSpPr/>
-          <p:nvPr/>
-        </p:nvCxnSpPr>
-        <p:spPr>
-          <a:xfrm>
-            <a:off x="2414536" y="1899539"/>
-            <a:ext cx="0" cy="2734323"/>
-          </a:xfrm>
-          <a:prstGeom prst="line">
-            <a:avLst/>
-          </a:prstGeom>
-          <a:ln w="25400">
-            <a:solidFill>
-              <a:srgbClr val="FF0000"/>
-            </a:solidFill>
-          </a:ln>
-        </p:spPr>
-        <p:style>
-          <a:lnRef idx="1">
-            <a:schemeClr val="accent1"/>
-          </a:lnRef>
-          <a:fillRef idx="0">
-            <a:schemeClr val="accent1"/>
-          </a:fillRef>
-          <a:effectRef idx="0">
-            <a:schemeClr val="accent1"/>
-          </a:effectRef>
-          <a:fontRef idx="minor">
-            <a:schemeClr val="tx1"/>
-          </a:fontRef>
-        </p:style>
-      </p:cxnSp>
-      <p:cxnSp>
-        <p:nvCxnSpPr>
-          <p:cNvPr id="9" name="直線コネクタ 8">
-            <a:extLst>
-              <a:ext uri="{FF2B5EF4-FFF2-40B4-BE49-F238E27FC236}">
-                <a16:creationId xmlns:a16="http://schemas.microsoft.com/office/drawing/2014/main" id="{3FA1048E-B109-40A8-80C7-A985207D7348}"/>
-              </a:ext>
-            </a:extLst>
-          </p:cNvPr>
-          <p:cNvCxnSpPr/>
-          <p:nvPr/>
-        </p:nvCxnSpPr>
-        <p:spPr>
-          <a:xfrm>
-            <a:off x="3092232" y="3832102"/>
-            <a:ext cx="0" cy="2734323"/>
-          </a:xfrm>
-          <a:prstGeom prst="line">
-            <a:avLst/>
-          </a:prstGeom>
-          <a:ln w="25400">
-            <a:solidFill>
-              <a:srgbClr val="FF0000"/>
-            </a:solidFill>
-          </a:ln>
-        </p:spPr>
-        <p:style>
-          <a:lnRef idx="1">
-            <a:schemeClr val="accent1"/>
-          </a:lnRef>
-          <a:fillRef idx="0">
-            <a:schemeClr val="accent1"/>
-          </a:fillRef>
-          <a:effectRef idx="0">
-            <a:schemeClr val="accent1"/>
-          </a:effectRef>
-          <a:fontRef idx="minor">
-            <a:schemeClr val="tx1"/>
-          </a:fontRef>
-        </p:style>
-      </p:cxnSp>
-      <p:cxnSp>
-        <p:nvCxnSpPr>
-          <p:cNvPr id="10" name="直線コネクタ 9">
-            <a:extLst>
-              <a:ext uri="{FF2B5EF4-FFF2-40B4-BE49-F238E27FC236}">
-                <a16:creationId xmlns:a16="http://schemas.microsoft.com/office/drawing/2014/main" id="{C710AACF-98A6-4DBD-AC30-97B91E07C704}"/>
-              </a:ext>
-            </a:extLst>
-          </p:cNvPr>
-          <p:cNvCxnSpPr/>
-          <p:nvPr/>
-        </p:nvCxnSpPr>
-        <p:spPr>
-          <a:xfrm>
-            <a:off x="8792638" y="1988709"/>
-            <a:ext cx="0" cy="2734323"/>
-          </a:xfrm>
-          <a:prstGeom prst="line">
-            <a:avLst/>
-          </a:prstGeom>
-          <a:ln w="25400">
-            <a:solidFill>
-              <a:srgbClr val="FF0000"/>
-            </a:solidFill>
-          </a:ln>
-        </p:spPr>
-        <p:style>
-          <a:lnRef idx="1">
-            <a:schemeClr val="accent1"/>
-          </a:lnRef>
-          <a:fillRef idx="0">
-            <a:schemeClr val="accent1"/>
-          </a:fillRef>
-          <a:effectRef idx="0">
-            <a:schemeClr val="accent1"/>
-          </a:effectRef>
-          <a:fontRef idx="minor">
-            <a:schemeClr val="tx1"/>
-          </a:fontRef>
-        </p:style>
-      </p:cxnSp>
-      <p:cxnSp>
-        <p:nvCxnSpPr>
-          <p:cNvPr id="11" name="直線コネクタ 10">
-            <a:extLst>
-              <a:ext uri="{FF2B5EF4-FFF2-40B4-BE49-F238E27FC236}">
-                <a16:creationId xmlns:a16="http://schemas.microsoft.com/office/drawing/2014/main" id="{5235C736-3445-4487-AE68-EE0CEDAF0552}"/>
-              </a:ext>
-            </a:extLst>
-          </p:cNvPr>
-          <p:cNvCxnSpPr/>
-          <p:nvPr/>
-        </p:nvCxnSpPr>
-        <p:spPr>
-          <a:xfrm>
-            <a:off x="8906127" y="3921272"/>
-            <a:ext cx="0" cy="2734323"/>
-          </a:xfrm>
-          <a:prstGeom prst="line">
-            <a:avLst/>
-          </a:prstGeom>
-          <a:ln w="25400">
-            <a:solidFill>
-              <a:srgbClr val="FF0000"/>
-            </a:solidFill>
-          </a:ln>
-        </p:spPr>
-        <p:style>
-          <a:lnRef idx="1">
-            <a:schemeClr val="accent1"/>
-          </a:lnRef>
-          <a:fillRef idx="0">
-            <a:schemeClr val="accent1"/>
-          </a:fillRef>
-          <a:effectRef idx="0">
-            <a:schemeClr val="accent1"/>
-          </a:effectRef>
-          <a:fontRef idx="minor">
-            <a:schemeClr val="tx1"/>
-          </a:fontRef>
-        </p:style>
-      </p:cxnSp>
       <p:sp>
         <p:nvSpPr>
           <p:cNvPr id="12" name="楕円 11">
@@ -5217,7 +5067,7 @@
         <p:spPr>
           <a:xfrm>
             <a:off x="1279640" y="3644792"/>
-            <a:ext cx="3749553" cy="914400"/>
+            <a:ext cx="4490845" cy="914400"/>
           </a:xfrm>
           <a:prstGeom prst="ellipse">
             <a:avLst/>
@@ -5303,6 +5153,434 @@
           <a:p>
             <a:pPr algn="ctr"/>
             <a:endParaRPr kumimoji="1" lang="ja-JP" altLang="en-US"/>
+          </a:p>
+        </p:txBody>
+      </p:sp>
+      <p:sp>
+        <p:nvSpPr>
+          <p:cNvPr id="14" name="楕円 13">
+            <a:extLst>
+              <a:ext uri="{FF2B5EF4-FFF2-40B4-BE49-F238E27FC236}">
+                <a16:creationId xmlns:a16="http://schemas.microsoft.com/office/drawing/2014/main" id="{13CB16F8-43CA-408F-A0A6-B8B05B268031}"/>
+              </a:ext>
+            </a:extLst>
+          </p:cNvPr>
+          <p:cNvSpPr/>
+          <p:nvPr/>
+        </p:nvSpPr>
+        <p:spPr>
+          <a:xfrm>
+            <a:off x="1216241" y="2514600"/>
+            <a:ext cx="1269507" cy="914400"/>
+          </a:xfrm>
+          <a:prstGeom prst="ellipse">
+            <a:avLst/>
+          </a:prstGeom>
+          <a:noFill/>
+          <a:ln w="25400">
+            <a:solidFill>
+              <a:srgbClr val="00B050"/>
+            </a:solidFill>
+          </a:ln>
+        </p:spPr>
+        <p:style>
+          <a:lnRef idx="2">
+            <a:schemeClr val="accent1">
+              <a:shade val="50000"/>
+            </a:schemeClr>
+          </a:lnRef>
+          <a:fillRef idx="1">
+            <a:schemeClr val="accent1"/>
+          </a:fillRef>
+          <a:effectRef idx="0">
+            <a:schemeClr val="accent1"/>
+          </a:effectRef>
+          <a:fontRef idx="minor">
+            <a:schemeClr val="lt1"/>
+          </a:fontRef>
+        </p:style>
+        <p:txBody>
+          <a:bodyPr rtlCol="0" anchor="ctr"/>
+          <a:lstStyle/>
+          <a:p>
+            <a:pPr algn="ctr"/>
+            <a:endParaRPr kumimoji="1" lang="ja-JP" altLang="en-US"/>
+          </a:p>
+        </p:txBody>
+      </p:sp>
+      <p:sp>
+        <p:nvSpPr>
+          <p:cNvPr id="15" name="楕円 14">
+            <a:extLst>
+              <a:ext uri="{FF2B5EF4-FFF2-40B4-BE49-F238E27FC236}">
+                <a16:creationId xmlns:a16="http://schemas.microsoft.com/office/drawing/2014/main" id="{F8A84072-BE34-43C7-BB91-898C0679ED32}"/>
+              </a:ext>
+            </a:extLst>
+          </p:cNvPr>
+          <p:cNvSpPr/>
+          <p:nvPr/>
+        </p:nvSpPr>
+        <p:spPr>
+          <a:xfrm>
+            <a:off x="2935577" y="4785805"/>
+            <a:ext cx="1742955" cy="914400"/>
+          </a:xfrm>
+          <a:prstGeom prst="ellipse">
+            <a:avLst/>
+          </a:prstGeom>
+          <a:noFill/>
+          <a:ln w="25400">
+            <a:solidFill>
+              <a:srgbClr val="00B050"/>
+            </a:solidFill>
+          </a:ln>
+        </p:spPr>
+        <p:style>
+          <a:lnRef idx="2">
+            <a:schemeClr val="accent1">
+              <a:shade val="50000"/>
+            </a:schemeClr>
+          </a:lnRef>
+          <a:fillRef idx="1">
+            <a:schemeClr val="accent1"/>
+          </a:fillRef>
+          <a:effectRef idx="0">
+            <a:schemeClr val="accent1"/>
+          </a:effectRef>
+          <a:fontRef idx="minor">
+            <a:schemeClr val="lt1"/>
+          </a:fontRef>
+        </p:style>
+        <p:txBody>
+          <a:bodyPr rtlCol="0" anchor="ctr"/>
+          <a:lstStyle/>
+          <a:p>
+            <a:pPr algn="ctr"/>
+            <a:endParaRPr kumimoji="1" lang="ja-JP" altLang="en-US"/>
+          </a:p>
+        </p:txBody>
+      </p:sp>
+      <p:sp>
+        <p:nvSpPr>
+          <p:cNvPr id="16" name="テキスト ボックス 15">
+            <a:extLst>
+              <a:ext uri="{FF2B5EF4-FFF2-40B4-BE49-F238E27FC236}">
+                <a16:creationId xmlns:a16="http://schemas.microsoft.com/office/drawing/2014/main" id="{6DA11831-3B5C-46BC-BF3B-A043FC277A5A}"/>
+              </a:ext>
+            </a:extLst>
+          </p:cNvPr>
+          <p:cNvSpPr txBox="1"/>
+          <p:nvPr/>
+        </p:nvSpPr>
+        <p:spPr>
+          <a:xfrm>
+            <a:off x="2318954" y="2236667"/>
+            <a:ext cx="317715" cy="369332"/>
+          </a:xfrm>
+          <a:prstGeom prst="rect">
+            <a:avLst/>
+          </a:prstGeom>
+          <a:noFill/>
+        </p:spPr>
+        <p:txBody>
+          <a:bodyPr wrap="none" rtlCol="0">
+            <a:spAutoFit/>
+          </a:bodyPr>
+          <a:lstStyle/>
+          <a:p>
+            <a:pPr algn="ctr"/>
+            <a:r>
+              <a:rPr kumimoji="1" lang="en-US" altLang="ja-JP" b="1" dirty="0"/>
+              <a:t>3</a:t>
+            </a:r>
+            <a:endParaRPr kumimoji="1" lang="ja-JP" altLang="en-US" b="1" dirty="0"/>
+          </a:p>
+        </p:txBody>
+      </p:sp>
+      <p:sp>
+        <p:nvSpPr>
+          <p:cNvPr id="17" name="テキスト ボックス 16">
+            <a:extLst>
+              <a:ext uri="{FF2B5EF4-FFF2-40B4-BE49-F238E27FC236}">
+                <a16:creationId xmlns:a16="http://schemas.microsoft.com/office/drawing/2014/main" id="{F9DB8BA6-5B71-40EF-9F0B-B2FCC33A2693}"/>
+              </a:ext>
+            </a:extLst>
+          </p:cNvPr>
+          <p:cNvSpPr txBox="1"/>
+          <p:nvPr/>
+        </p:nvSpPr>
+        <p:spPr>
+          <a:xfrm>
+            <a:off x="4058952" y="3275460"/>
+            <a:ext cx="395784" cy="369332"/>
+          </a:xfrm>
+          <a:prstGeom prst="rect">
+            <a:avLst/>
+          </a:prstGeom>
+          <a:noFill/>
+        </p:spPr>
+        <p:txBody>
+          <a:bodyPr wrap="square" rtlCol="0">
+            <a:spAutoFit/>
+          </a:bodyPr>
+          <a:lstStyle/>
+          <a:p>
+            <a:pPr algn="ctr"/>
+            <a:r>
+              <a:rPr lang="ja-JP" altLang="en-US" b="1" dirty="0"/>
+              <a:t>２</a:t>
+            </a:r>
+            <a:endParaRPr kumimoji="1" lang="ja-JP" altLang="en-US" b="1" dirty="0"/>
+          </a:p>
+        </p:txBody>
+      </p:sp>
+      <p:sp>
+        <p:nvSpPr>
+          <p:cNvPr id="18" name="テキスト ボックス 17">
+            <a:extLst>
+              <a:ext uri="{FF2B5EF4-FFF2-40B4-BE49-F238E27FC236}">
+                <a16:creationId xmlns:a16="http://schemas.microsoft.com/office/drawing/2014/main" id="{8C7D5179-D866-450E-B4F2-2AE1396C7E3E}"/>
+              </a:ext>
+            </a:extLst>
+          </p:cNvPr>
+          <p:cNvSpPr txBox="1"/>
+          <p:nvPr/>
+        </p:nvSpPr>
+        <p:spPr>
+          <a:xfrm>
+            <a:off x="3872199" y="5705617"/>
+            <a:ext cx="384645" cy="369332"/>
+          </a:xfrm>
+          <a:prstGeom prst="rect">
+            <a:avLst/>
+          </a:prstGeom>
+          <a:noFill/>
+        </p:spPr>
+        <p:txBody>
+          <a:bodyPr wrap="square" rtlCol="0">
+            <a:spAutoFit/>
+          </a:bodyPr>
+          <a:lstStyle/>
+          <a:p>
+            <a:pPr algn="ctr"/>
+            <a:r>
+              <a:rPr kumimoji="1" lang="ja-JP" altLang="en-US" b="1" dirty="0"/>
+              <a:t>１</a:t>
+            </a:r>
+          </a:p>
+        </p:txBody>
+      </p:sp>
+      <p:sp>
+        <p:nvSpPr>
+          <p:cNvPr id="19" name="楕円 18">
+            <a:extLst>
+              <a:ext uri="{FF2B5EF4-FFF2-40B4-BE49-F238E27FC236}">
+                <a16:creationId xmlns:a16="http://schemas.microsoft.com/office/drawing/2014/main" id="{BDA4200C-D36C-40E8-B19A-7AC927929B94}"/>
+              </a:ext>
+            </a:extLst>
+          </p:cNvPr>
+          <p:cNvSpPr/>
+          <p:nvPr/>
+        </p:nvSpPr>
+        <p:spPr>
+          <a:xfrm>
+            <a:off x="6914553" y="2440180"/>
+            <a:ext cx="1957223" cy="914400"/>
+          </a:xfrm>
+          <a:prstGeom prst="ellipse">
+            <a:avLst/>
+          </a:prstGeom>
+          <a:noFill/>
+          <a:ln w="25400">
+            <a:solidFill>
+              <a:srgbClr val="00B050"/>
+            </a:solidFill>
+          </a:ln>
+        </p:spPr>
+        <p:style>
+          <a:lnRef idx="2">
+            <a:schemeClr val="accent1">
+              <a:shade val="50000"/>
+            </a:schemeClr>
+          </a:lnRef>
+          <a:fillRef idx="1">
+            <a:schemeClr val="accent1"/>
+          </a:fillRef>
+          <a:effectRef idx="0">
+            <a:schemeClr val="accent1"/>
+          </a:effectRef>
+          <a:fontRef idx="minor">
+            <a:schemeClr val="lt1"/>
+          </a:fontRef>
+        </p:style>
+        <p:txBody>
+          <a:bodyPr rtlCol="0" anchor="ctr"/>
+          <a:lstStyle/>
+          <a:p>
+            <a:pPr algn="ctr"/>
+            <a:endParaRPr kumimoji="1" lang="ja-JP" altLang="en-US"/>
+          </a:p>
+        </p:txBody>
+      </p:sp>
+      <p:sp>
+        <p:nvSpPr>
+          <p:cNvPr id="20" name="楕円 19">
+            <a:extLst>
+              <a:ext uri="{FF2B5EF4-FFF2-40B4-BE49-F238E27FC236}">
+                <a16:creationId xmlns:a16="http://schemas.microsoft.com/office/drawing/2014/main" id="{7F48252F-AAEA-40C6-B4FC-E692EFA42B9C}"/>
+              </a:ext>
+            </a:extLst>
+          </p:cNvPr>
+          <p:cNvSpPr/>
+          <p:nvPr/>
+        </p:nvSpPr>
+        <p:spPr>
+          <a:xfrm>
+            <a:off x="8871776" y="4668500"/>
+            <a:ext cx="2349599" cy="914400"/>
+          </a:xfrm>
+          <a:prstGeom prst="ellipse">
+            <a:avLst/>
+          </a:prstGeom>
+          <a:noFill/>
+          <a:ln w="25400">
+            <a:solidFill>
+              <a:srgbClr val="00B050"/>
+            </a:solidFill>
+          </a:ln>
+        </p:spPr>
+        <p:style>
+          <a:lnRef idx="2">
+            <a:schemeClr val="accent1">
+              <a:shade val="50000"/>
+            </a:schemeClr>
+          </a:lnRef>
+          <a:fillRef idx="1">
+            <a:schemeClr val="accent1"/>
+          </a:fillRef>
+          <a:effectRef idx="0">
+            <a:schemeClr val="accent1"/>
+          </a:effectRef>
+          <a:fontRef idx="minor">
+            <a:schemeClr val="lt1"/>
+          </a:fontRef>
+        </p:style>
+        <p:txBody>
+          <a:bodyPr rtlCol="0" anchor="ctr"/>
+          <a:lstStyle/>
+          <a:p>
+            <a:pPr algn="ctr"/>
+            <a:endParaRPr kumimoji="1" lang="ja-JP" altLang="en-US"/>
+          </a:p>
+        </p:txBody>
+      </p:sp>
+      <p:sp>
+        <p:nvSpPr>
+          <p:cNvPr id="21" name="テキスト ボックス 20">
+            <a:extLst>
+              <a:ext uri="{FF2B5EF4-FFF2-40B4-BE49-F238E27FC236}">
+                <a16:creationId xmlns:a16="http://schemas.microsoft.com/office/drawing/2014/main" id="{1A2EAEB7-8787-4277-A3B7-5686A7F588E7}"/>
+              </a:ext>
+            </a:extLst>
+          </p:cNvPr>
+          <p:cNvSpPr txBox="1"/>
+          <p:nvPr/>
+        </p:nvSpPr>
+        <p:spPr>
+          <a:xfrm>
+            <a:off x="8706437" y="2236667"/>
+            <a:ext cx="317715" cy="369332"/>
+          </a:xfrm>
+          <a:prstGeom prst="rect">
+            <a:avLst/>
+          </a:prstGeom>
+          <a:noFill/>
+        </p:spPr>
+        <p:txBody>
+          <a:bodyPr wrap="none" rtlCol="0">
+            <a:spAutoFit/>
+          </a:bodyPr>
+          <a:lstStyle/>
+          <a:p>
+            <a:pPr algn="ctr"/>
+            <a:r>
+              <a:rPr kumimoji="1" lang="en-US" altLang="ja-JP" b="1" dirty="0"/>
+              <a:t>3</a:t>
+            </a:r>
+            <a:endParaRPr kumimoji="1" lang="ja-JP" altLang="en-US" b="1" dirty="0"/>
+          </a:p>
+        </p:txBody>
+      </p:sp>
+      <p:sp>
+        <p:nvSpPr>
+          <p:cNvPr id="22" name="テキスト ボックス 21">
+            <a:extLst>
+              <a:ext uri="{FF2B5EF4-FFF2-40B4-BE49-F238E27FC236}">
+                <a16:creationId xmlns:a16="http://schemas.microsoft.com/office/drawing/2014/main" id="{E23B2042-9531-4ED0-B845-6BB0CA7ECD18}"/>
+              </a:ext>
+            </a:extLst>
+          </p:cNvPr>
+          <p:cNvSpPr txBox="1"/>
+          <p:nvPr/>
+        </p:nvSpPr>
+        <p:spPr>
+          <a:xfrm>
+            <a:off x="9822963" y="3253011"/>
+            <a:ext cx="395784" cy="369332"/>
+          </a:xfrm>
+          <a:prstGeom prst="rect">
+            <a:avLst/>
+          </a:prstGeom>
+          <a:noFill/>
+        </p:spPr>
+        <p:txBody>
+          <a:bodyPr wrap="square" rtlCol="0">
+            <a:spAutoFit/>
+          </a:bodyPr>
+          <a:lstStyle/>
+          <a:p>
+            <a:pPr algn="ctr"/>
+            <a:r>
+              <a:rPr lang="ja-JP" altLang="en-US" b="1" dirty="0"/>
+              <a:t>２</a:t>
+            </a:r>
+            <a:endParaRPr kumimoji="1" lang="ja-JP" altLang="en-US" b="1" dirty="0"/>
+          </a:p>
+        </p:txBody>
+      </p:sp>
+      <p:sp>
+        <p:nvSpPr>
+          <p:cNvPr id="23" name="テキスト ボックス 22">
+            <a:extLst>
+              <a:ext uri="{FF2B5EF4-FFF2-40B4-BE49-F238E27FC236}">
+                <a16:creationId xmlns:a16="http://schemas.microsoft.com/office/drawing/2014/main" id="{F5EDDD57-BC69-422E-A122-99B8CD7EAA3C}"/>
+              </a:ext>
+            </a:extLst>
+          </p:cNvPr>
+          <p:cNvSpPr txBox="1"/>
+          <p:nvPr/>
+        </p:nvSpPr>
+        <p:spPr>
+          <a:xfrm>
+            <a:off x="8871777" y="5491853"/>
+            <a:ext cx="384645" cy="369332"/>
+          </a:xfrm>
+          <a:prstGeom prst="rect">
+            <a:avLst/>
+          </a:prstGeom>
+          <a:noFill/>
+        </p:spPr>
+        <p:txBody>
+          <a:bodyPr wrap="square" rtlCol="0">
+            <a:spAutoFit/>
+          </a:bodyPr>
+          <a:lstStyle/>
+          <a:p>
+            <a:pPr algn="ctr"/>
+            <a:r>
+              <a:rPr kumimoji="1" lang="ja-JP" altLang="en-US" b="1" dirty="0"/>
+              <a:t>１</a:t>
+            </a:r>
           </a:p>
         </p:txBody>
       </p:sp>
@@ -5553,176 +5831,12 @@
           </a:p>
         </p:txBody>
       </p:sp>
-      <p:cxnSp>
-        <p:nvCxnSpPr>
-          <p:cNvPr id="7" name="直線コネクタ 6">
-            <a:extLst>
-              <a:ext uri="{FF2B5EF4-FFF2-40B4-BE49-F238E27FC236}">
-                <a16:creationId xmlns:a16="http://schemas.microsoft.com/office/drawing/2014/main" id="{5EA8570F-05D8-4E93-9266-909861A23C63}"/>
-              </a:ext>
-            </a:extLst>
-          </p:cNvPr>
-          <p:cNvCxnSpPr/>
-          <p:nvPr/>
-        </p:nvCxnSpPr>
-        <p:spPr>
-          <a:xfrm>
-            <a:off x="3173295" y="1899539"/>
-            <a:ext cx="0" cy="2734323"/>
-          </a:xfrm>
-          <a:prstGeom prst="line">
-            <a:avLst/>
-          </a:prstGeom>
-          <a:ln w="25400">
-            <a:solidFill>
-              <a:srgbClr val="FF0000"/>
-            </a:solidFill>
-          </a:ln>
-        </p:spPr>
-        <p:style>
-          <a:lnRef idx="1">
-            <a:schemeClr val="accent1"/>
-          </a:lnRef>
-          <a:fillRef idx="0">
-            <a:schemeClr val="accent1"/>
-          </a:fillRef>
-          <a:effectRef idx="0">
-            <a:schemeClr val="accent1"/>
-          </a:effectRef>
-          <a:fontRef idx="minor">
-            <a:schemeClr val="tx1"/>
-          </a:fontRef>
-        </p:style>
-      </p:cxnSp>
-      <p:cxnSp>
-        <p:nvCxnSpPr>
-          <p:cNvPr id="8" name="直線コネクタ 7">
-            <a:extLst>
-              <a:ext uri="{FF2B5EF4-FFF2-40B4-BE49-F238E27FC236}">
-                <a16:creationId xmlns:a16="http://schemas.microsoft.com/office/drawing/2014/main" id="{706AE07A-5514-46B0-9AFD-2F4FAB2C6CEB}"/>
-              </a:ext>
-            </a:extLst>
-          </p:cNvPr>
-          <p:cNvCxnSpPr/>
-          <p:nvPr/>
-        </p:nvCxnSpPr>
-        <p:spPr>
-          <a:xfrm>
-            <a:off x="3043594" y="3841830"/>
-            <a:ext cx="0" cy="2734323"/>
-          </a:xfrm>
-          <a:prstGeom prst="line">
-            <a:avLst/>
-          </a:prstGeom>
-          <a:ln w="25400">
-            <a:solidFill>
-              <a:srgbClr val="FF0000"/>
-            </a:solidFill>
-          </a:ln>
-        </p:spPr>
-        <p:style>
-          <a:lnRef idx="1">
-            <a:schemeClr val="accent1"/>
-          </a:lnRef>
-          <a:fillRef idx="0">
-            <a:schemeClr val="accent1"/>
-          </a:fillRef>
-          <a:effectRef idx="0">
-            <a:schemeClr val="accent1"/>
-          </a:effectRef>
-          <a:fontRef idx="minor">
-            <a:schemeClr val="tx1"/>
-          </a:fontRef>
-        </p:style>
-      </p:cxnSp>
-      <p:cxnSp>
-        <p:nvCxnSpPr>
-          <p:cNvPr id="9" name="直線コネクタ 8">
-            <a:extLst>
-              <a:ext uri="{FF2B5EF4-FFF2-40B4-BE49-F238E27FC236}">
-                <a16:creationId xmlns:a16="http://schemas.microsoft.com/office/drawing/2014/main" id="{66E5291C-B338-4C98-9E5D-FCED6E7583B8}"/>
-              </a:ext>
-            </a:extLst>
-          </p:cNvPr>
-          <p:cNvCxnSpPr/>
-          <p:nvPr/>
-        </p:nvCxnSpPr>
-        <p:spPr>
-          <a:xfrm>
-            <a:off x="8919097" y="1988709"/>
-            <a:ext cx="0" cy="2734323"/>
-          </a:xfrm>
-          <a:prstGeom prst="line">
-            <a:avLst/>
-          </a:prstGeom>
-          <a:ln w="25400">
-            <a:solidFill>
-              <a:srgbClr val="FF0000"/>
-            </a:solidFill>
-          </a:ln>
-        </p:spPr>
-        <p:style>
-          <a:lnRef idx="1">
-            <a:schemeClr val="accent1"/>
-          </a:lnRef>
-          <a:fillRef idx="0">
-            <a:schemeClr val="accent1"/>
-          </a:fillRef>
-          <a:effectRef idx="0">
-            <a:schemeClr val="accent1"/>
-          </a:effectRef>
-          <a:fontRef idx="minor">
-            <a:schemeClr val="tx1"/>
-          </a:fontRef>
-        </p:style>
-      </p:cxnSp>
-      <p:cxnSp>
-        <p:nvCxnSpPr>
-          <p:cNvPr id="10" name="直線コネクタ 9">
-            <a:extLst>
-              <a:ext uri="{FF2B5EF4-FFF2-40B4-BE49-F238E27FC236}">
-                <a16:creationId xmlns:a16="http://schemas.microsoft.com/office/drawing/2014/main" id="{6D8AA460-EB34-4A9E-97DA-FB93FDD9E778}"/>
-              </a:ext>
-            </a:extLst>
-          </p:cNvPr>
-          <p:cNvCxnSpPr/>
-          <p:nvPr/>
-        </p:nvCxnSpPr>
-        <p:spPr>
-          <a:xfrm>
-            <a:off x="8886671" y="3921272"/>
-            <a:ext cx="0" cy="2734323"/>
-          </a:xfrm>
-          <a:prstGeom prst="line">
-            <a:avLst/>
-          </a:prstGeom>
-          <a:ln w="25400">
-            <a:solidFill>
-              <a:srgbClr val="FF0000"/>
-            </a:solidFill>
-          </a:ln>
-        </p:spPr>
-        <p:style>
-          <a:lnRef idx="1">
-            <a:schemeClr val="accent1"/>
-          </a:lnRef>
-          <a:fillRef idx="0">
-            <a:schemeClr val="accent1"/>
-          </a:fillRef>
-          <a:effectRef idx="0">
-            <a:schemeClr val="accent1"/>
-          </a:effectRef>
-          <a:fontRef idx="minor">
-            <a:schemeClr val="tx1"/>
-          </a:fontRef>
-        </p:style>
-      </p:cxnSp>
-      <p:sp>
-        <p:nvSpPr>
-          <p:cNvPr id="11" name="楕円 10">
-            <a:extLst>
-              <a:ext uri="{FF2B5EF4-FFF2-40B4-BE49-F238E27FC236}">
-                <a16:creationId xmlns:a16="http://schemas.microsoft.com/office/drawing/2014/main" id="{3B2B8EF8-53A1-41FD-B85F-25B598407345}"/>
+      <p:sp>
+        <p:nvSpPr>
+          <p:cNvPr id="13" name="楕円 12">
+            <a:extLst>
+              <a:ext uri="{FF2B5EF4-FFF2-40B4-BE49-F238E27FC236}">
+                <a16:creationId xmlns:a16="http://schemas.microsoft.com/office/drawing/2014/main" id="{CA5EC698-1282-41F6-B000-081E2E717611}"/>
               </a:ext>
             </a:extLst>
           </p:cNvPr>
@@ -5731,8 +5845,8 @@
         </p:nvSpPr>
         <p:spPr>
           <a:xfrm>
-            <a:off x="1279640" y="3644792"/>
-            <a:ext cx="3749553" cy="914400"/>
+            <a:off x="1279640" y="3860584"/>
+            <a:ext cx="3798387" cy="698608"/>
           </a:xfrm>
           <a:prstGeom prst="ellipse">
             <a:avLst/>
@@ -5771,10 +5885,10 @@
       </p:sp>
       <p:sp>
         <p:nvSpPr>
-          <p:cNvPr id="12" name="楕円 11">
-            <a:extLst>
-              <a:ext uri="{FF2B5EF4-FFF2-40B4-BE49-F238E27FC236}">
-                <a16:creationId xmlns:a16="http://schemas.microsoft.com/office/drawing/2014/main" id="{AF6F7282-2BEC-4158-ACCB-02C2E8266A93}"/>
+          <p:cNvPr id="14" name="楕円 13">
+            <a:extLst>
+              <a:ext uri="{FF2B5EF4-FFF2-40B4-BE49-F238E27FC236}">
+                <a16:creationId xmlns:a16="http://schemas.microsoft.com/office/drawing/2014/main" id="{B51BDAAF-F266-446F-B073-9BD5C8712AAE}"/>
               </a:ext>
             </a:extLst>
           </p:cNvPr>
@@ -5783,8 +5897,8 @@
         </p:nvSpPr>
         <p:spPr>
           <a:xfrm>
-            <a:off x="7249180" y="3554340"/>
-            <a:ext cx="3749553" cy="914400"/>
+            <a:off x="7857339" y="3554340"/>
+            <a:ext cx="3938916" cy="914400"/>
           </a:xfrm>
           <a:prstGeom prst="ellipse">
             <a:avLst/>
@@ -5818,6 +5932,434 @@
           <a:p>
             <a:pPr algn="ctr"/>
             <a:endParaRPr kumimoji="1" lang="ja-JP" altLang="en-US"/>
+          </a:p>
+        </p:txBody>
+      </p:sp>
+      <p:sp>
+        <p:nvSpPr>
+          <p:cNvPr id="15" name="楕円 14">
+            <a:extLst>
+              <a:ext uri="{FF2B5EF4-FFF2-40B4-BE49-F238E27FC236}">
+                <a16:creationId xmlns:a16="http://schemas.microsoft.com/office/drawing/2014/main" id="{229B8001-361F-417A-B156-9DB8C59CECDB}"/>
+              </a:ext>
+            </a:extLst>
+          </p:cNvPr>
+          <p:cNvSpPr/>
+          <p:nvPr/>
+        </p:nvSpPr>
+        <p:spPr>
+          <a:xfrm>
+            <a:off x="1044934" y="2730392"/>
+            <a:ext cx="3137463" cy="698608"/>
+          </a:xfrm>
+          <a:prstGeom prst="ellipse">
+            <a:avLst/>
+          </a:prstGeom>
+          <a:noFill/>
+          <a:ln w="25400">
+            <a:solidFill>
+              <a:srgbClr val="00B050"/>
+            </a:solidFill>
+          </a:ln>
+        </p:spPr>
+        <p:style>
+          <a:lnRef idx="2">
+            <a:schemeClr val="accent1">
+              <a:shade val="50000"/>
+            </a:schemeClr>
+          </a:lnRef>
+          <a:fillRef idx="1">
+            <a:schemeClr val="accent1"/>
+          </a:fillRef>
+          <a:effectRef idx="0">
+            <a:schemeClr val="accent1"/>
+          </a:effectRef>
+          <a:fontRef idx="minor">
+            <a:schemeClr val="lt1"/>
+          </a:fontRef>
+        </p:style>
+        <p:txBody>
+          <a:bodyPr rtlCol="0" anchor="ctr"/>
+          <a:lstStyle/>
+          <a:p>
+            <a:pPr algn="ctr"/>
+            <a:endParaRPr kumimoji="1" lang="ja-JP" altLang="en-US"/>
+          </a:p>
+        </p:txBody>
+      </p:sp>
+      <p:sp>
+        <p:nvSpPr>
+          <p:cNvPr id="16" name="楕円 15">
+            <a:extLst>
+              <a:ext uri="{FF2B5EF4-FFF2-40B4-BE49-F238E27FC236}">
+                <a16:creationId xmlns:a16="http://schemas.microsoft.com/office/drawing/2014/main" id="{EEB7128D-B591-4F4A-A384-4562E97AFD7D}"/>
+              </a:ext>
+            </a:extLst>
+          </p:cNvPr>
+          <p:cNvSpPr/>
+          <p:nvPr/>
+        </p:nvSpPr>
+        <p:spPr>
+          <a:xfrm>
+            <a:off x="2636668" y="5020065"/>
+            <a:ext cx="2996527" cy="680140"/>
+          </a:xfrm>
+          <a:prstGeom prst="ellipse">
+            <a:avLst/>
+          </a:prstGeom>
+          <a:noFill/>
+          <a:ln w="25400">
+            <a:solidFill>
+              <a:srgbClr val="00B050"/>
+            </a:solidFill>
+          </a:ln>
+        </p:spPr>
+        <p:style>
+          <a:lnRef idx="2">
+            <a:schemeClr val="accent1">
+              <a:shade val="50000"/>
+            </a:schemeClr>
+          </a:lnRef>
+          <a:fillRef idx="1">
+            <a:schemeClr val="accent1"/>
+          </a:fillRef>
+          <a:effectRef idx="0">
+            <a:schemeClr val="accent1"/>
+          </a:effectRef>
+          <a:fontRef idx="minor">
+            <a:schemeClr val="lt1"/>
+          </a:fontRef>
+        </p:style>
+        <p:txBody>
+          <a:bodyPr rtlCol="0" anchor="ctr"/>
+          <a:lstStyle/>
+          <a:p>
+            <a:pPr algn="ctr"/>
+            <a:endParaRPr kumimoji="1" lang="ja-JP" altLang="en-US"/>
+          </a:p>
+        </p:txBody>
+      </p:sp>
+      <p:sp>
+        <p:nvSpPr>
+          <p:cNvPr id="17" name="テキスト ボックス 16">
+            <a:extLst>
+              <a:ext uri="{FF2B5EF4-FFF2-40B4-BE49-F238E27FC236}">
+                <a16:creationId xmlns:a16="http://schemas.microsoft.com/office/drawing/2014/main" id="{840B6B13-F033-4B53-B0DB-7C79591E23FC}"/>
+              </a:ext>
+            </a:extLst>
+          </p:cNvPr>
+          <p:cNvSpPr txBox="1"/>
+          <p:nvPr/>
+        </p:nvSpPr>
+        <p:spPr>
+          <a:xfrm>
+            <a:off x="2318954" y="2378711"/>
+            <a:ext cx="317715" cy="369332"/>
+          </a:xfrm>
+          <a:prstGeom prst="rect">
+            <a:avLst/>
+          </a:prstGeom>
+          <a:noFill/>
+        </p:spPr>
+        <p:txBody>
+          <a:bodyPr wrap="none" rtlCol="0">
+            <a:spAutoFit/>
+          </a:bodyPr>
+          <a:lstStyle/>
+          <a:p>
+            <a:pPr algn="ctr"/>
+            <a:r>
+              <a:rPr kumimoji="1" lang="en-US" altLang="ja-JP" b="1" dirty="0"/>
+              <a:t>3</a:t>
+            </a:r>
+            <a:endParaRPr kumimoji="1" lang="ja-JP" altLang="en-US" b="1" dirty="0"/>
+          </a:p>
+        </p:txBody>
+      </p:sp>
+      <p:sp>
+        <p:nvSpPr>
+          <p:cNvPr id="18" name="テキスト ボックス 17">
+            <a:extLst>
+              <a:ext uri="{FF2B5EF4-FFF2-40B4-BE49-F238E27FC236}">
+                <a16:creationId xmlns:a16="http://schemas.microsoft.com/office/drawing/2014/main" id="{5C4DA937-A3DE-4282-B238-F29F190C0D93}"/>
+              </a:ext>
+            </a:extLst>
+          </p:cNvPr>
+          <p:cNvSpPr txBox="1"/>
+          <p:nvPr/>
+        </p:nvSpPr>
+        <p:spPr>
+          <a:xfrm>
+            <a:off x="4058952" y="3612811"/>
+            <a:ext cx="395784" cy="369332"/>
+          </a:xfrm>
+          <a:prstGeom prst="rect">
+            <a:avLst/>
+          </a:prstGeom>
+          <a:noFill/>
+        </p:spPr>
+        <p:txBody>
+          <a:bodyPr wrap="square" rtlCol="0">
+            <a:spAutoFit/>
+          </a:bodyPr>
+          <a:lstStyle/>
+          <a:p>
+            <a:pPr algn="ctr"/>
+            <a:r>
+              <a:rPr lang="ja-JP" altLang="en-US" b="1" dirty="0"/>
+              <a:t>２</a:t>
+            </a:r>
+            <a:endParaRPr kumimoji="1" lang="ja-JP" altLang="en-US" b="1" dirty="0"/>
+          </a:p>
+        </p:txBody>
+      </p:sp>
+      <p:sp>
+        <p:nvSpPr>
+          <p:cNvPr id="19" name="テキスト ボックス 18">
+            <a:extLst>
+              <a:ext uri="{FF2B5EF4-FFF2-40B4-BE49-F238E27FC236}">
+                <a16:creationId xmlns:a16="http://schemas.microsoft.com/office/drawing/2014/main" id="{96C25F56-05E3-4D3B-8DD7-EAA82231972E}"/>
+              </a:ext>
+            </a:extLst>
+          </p:cNvPr>
+          <p:cNvSpPr txBox="1"/>
+          <p:nvPr/>
+        </p:nvSpPr>
+        <p:spPr>
+          <a:xfrm>
+            <a:off x="3872199" y="5705617"/>
+            <a:ext cx="384645" cy="369332"/>
+          </a:xfrm>
+          <a:prstGeom prst="rect">
+            <a:avLst/>
+          </a:prstGeom>
+          <a:noFill/>
+        </p:spPr>
+        <p:txBody>
+          <a:bodyPr wrap="square" rtlCol="0">
+            <a:spAutoFit/>
+          </a:bodyPr>
+          <a:lstStyle/>
+          <a:p>
+            <a:pPr algn="ctr"/>
+            <a:r>
+              <a:rPr kumimoji="1" lang="ja-JP" altLang="en-US" b="1" dirty="0"/>
+              <a:t>１</a:t>
+            </a:r>
+          </a:p>
+        </p:txBody>
+      </p:sp>
+      <p:sp>
+        <p:nvSpPr>
+          <p:cNvPr id="20" name="楕円 19">
+            <a:extLst>
+              <a:ext uri="{FF2B5EF4-FFF2-40B4-BE49-F238E27FC236}">
+                <a16:creationId xmlns:a16="http://schemas.microsoft.com/office/drawing/2014/main" id="{AB852704-8149-48C5-967D-A65BB34EB579}"/>
+              </a:ext>
+            </a:extLst>
+          </p:cNvPr>
+          <p:cNvSpPr/>
+          <p:nvPr/>
+        </p:nvSpPr>
+        <p:spPr>
+          <a:xfrm>
+            <a:off x="7306322" y="2606000"/>
+            <a:ext cx="1757778" cy="590156"/>
+          </a:xfrm>
+          <a:prstGeom prst="ellipse">
+            <a:avLst/>
+          </a:prstGeom>
+          <a:noFill/>
+          <a:ln w="25400">
+            <a:solidFill>
+              <a:srgbClr val="00B050"/>
+            </a:solidFill>
+          </a:ln>
+        </p:spPr>
+        <p:style>
+          <a:lnRef idx="2">
+            <a:schemeClr val="accent1">
+              <a:shade val="50000"/>
+            </a:schemeClr>
+          </a:lnRef>
+          <a:fillRef idx="1">
+            <a:schemeClr val="accent1"/>
+          </a:fillRef>
+          <a:effectRef idx="0">
+            <a:schemeClr val="accent1"/>
+          </a:effectRef>
+          <a:fontRef idx="minor">
+            <a:schemeClr val="lt1"/>
+          </a:fontRef>
+        </p:style>
+        <p:txBody>
+          <a:bodyPr rtlCol="0" anchor="ctr"/>
+          <a:lstStyle/>
+          <a:p>
+            <a:pPr algn="ctr"/>
+            <a:endParaRPr kumimoji="1" lang="ja-JP" altLang="en-US"/>
+          </a:p>
+        </p:txBody>
+      </p:sp>
+      <p:sp>
+        <p:nvSpPr>
+          <p:cNvPr id="21" name="楕円 20">
+            <a:extLst>
+              <a:ext uri="{FF2B5EF4-FFF2-40B4-BE49-F238E27FC236}">
+                <a16:creationId xmlns:a16="http://schemas.microsoft.com/office/drawing/2014/main" id="{9C966FD9-B690-4CB3-B17F-59E34C8C16EF}"/>
+              </a:ext>
+            </a:extLst>
+          </p:cNvPr>
+          <p:cNvSpPr/>
+          <p:nvPr/>
+        </p:nvSpPr>
+        <p:spPr>
+          <a:xfrm>
+            <a:off x="8354112" y="4668500"/>
+            <a:ext cx="2050517" cy="914400"/>
+          </a:xfrm>
+          <a:prstGeom prst="ellipse">
+            <a:avLst/>
+          </a:prstGeom>
+          <a:noFill/>
+          <a:ln w="25400">
+            <a:solidFill>
+              <a:srgbClr val="00B050"/>
+            </a:solidFill>
+          </a:ln>
+        </p:spPr>
+        <p:style>
+          <a:lnRef idx="2">
+            <a:schemeClr val="accent1">
+              <a:shade val="50000"/>
+            </a:schemeClr>
+          </a:lnRef>
+          <a:fillRef idx="1">
+            <a:schemeClr val="accent1"/>
+          </a:fillRef>
+          <a:effectRef idx="0">
+            <a:schemeClr val="accent1"/>
+          </a:effectRef>
+          <a:fontRef idx="minor">
+            <a:schemeClr val="lt1"/>
+          </a:fontRef>
+        </p:style>
+        <p:txBody>
+          <a:bodyPr rtlCol="0" anchor="ctr"/>
+          <a:lstStyle/>
+          <a:p>
+            <a:pPr algn="ctr"/>
+            <a:endParaRPr kumimoji="1" lang="ja-JP" altLang="en-US"/>
+          </a:p>
+        </p:txBody>
+      </p:sp>
+      <p:sp>
+        <p:nvSpPr>
+          <p:cNvPr id="22" name="テキスト ボックス 21">
+            <a:extLst>
+              <a:ext uri="{FF2B5EF4-FFF2-40B4-BE49-F238E27FC236}">
+                <a16:creationId xmlns:a16="http://schemas.microsoft.com/office/drawing/2014/main" id="{2091BB11-7959-44CC-B5CB-5AB1D7F2407F}"/>
+              </a:ext>
+            </a:extLst>
+          </p:cNvPr>
+          <p:cNvSpPr txBox="1"/>
+          <p:nvPr/>
+        </p:nvSpPr>
+        <p:spPr>
+          <a:xfrm>
+            <a:off x="8706437" y="2396466"/>
+            <a:ext cx="317715" cy="369332"/>
+          </a:xfrm>
+          <a:prstGeom prst="rect">
+            <a:avLst/>
+          </a:prstGeom>
+          <a:noFill/>
+        </p:spPr>
+        <p:txBody>
+          <a:bodyPr wrap="none" rtlCol="0">
+            <a:spAutoFit/>
+          </a:bodyPr>
+          <a:lstStyle/>
+          <a:p>
+            <a:pPr algn="ctr"/>
+            <a:r>
+              <a:rPr kumimoji="1" lang="en-US" altLang="ja-JP" b="1" dirty="0"/>
+              <a:t>3</a:t>
+            </a:r>
+            <a:endParaRPr kumimoji="1" lang="ja-JP" altLang="en-US" b="1" dirty="0"/>
+          </a:p>
+        </p:txBody>
+      </p:sp>
+      <p:sp>
+        <p:nvSpPr>
+          <p:cNvPr id="23" name="テキスト ボックス 22">
+            <a:extLst>
+              <a:ext uri="{FF2B5EF4-FFF2-40B4-BE49-F238E27FC236}">
+                <a16:creationId xmlns:a16="http://schemas.microsoft.com/office/drawing/2014/main" id="{0713D81F-2A52-4A77-BCBA-28AB1027845A}"/>
+              </a:ext>
+            </a:extLst>
+          </p:cNvPr>
+          <p:cNvSpPr txBox="1"/>
+          <p:nvPr/>
+        </p:nvSpPr>
+        <p:spPr>
+          <a:xfrm>
+            <a:off x="9822963" y="3208621"/>
+            <a:ext cx="395784" cy="369332"/>
+          </a:xfrm>
+          <a:prstGeom prst="rect">
+            <a:avLst/>
+          </a:prstGeom>
+          <a:noFill/>
+        </p:spPr>
+        <p:txBody>
+          <a:bodyPr wrap="square" rtlCol="0">
+            <a:spAutoFit/>
+          </a:bodyPr>
+          <a:lstStyle/>
+          <a:p>
+            <a:pPr algn="ctr"/>
+            <a:r>
+              <a:rPr lang="ja-JP" altLang="en-US" b="1" dirty="0"/>
+              <a:t>２</a:t>
+            </a:r>
+            <a:endParaRPr kumimoji="1" lang="ja-JP" altLang="en-US" b="1" dirty="0"/>
+          </a:p>
+        </p:txBody>
+      </p:sp>
+      <p:sp>
+        <p:nvSpPr>
+          <p:cNvPr id="24" name="テキスト ボックス 23">
+            <a:extLst>
+              <a:ext uri="{FF2B5EF4-FFF2-40B4-BE49-F238E27FC236}">
+                <a16:creationId xmlns:a16="http://schemas.microsoft.com/office/drawing/2014/main" id="{FB50E66E-B632-479D-8E94-64B03A5A54E2}"/>
+              </a:ext>
+            </a:extLst>
+          </p:cNvPr>
+          <p:cNvSpPr txBox="1"/>
+          <p:nvPr/>
+        </p:nvSpPr>
+        <p:spPr>
+          <a:xfrm>
+            <a:off x="8871777" y="5571753"/>
+            <a:ext cx="384645" cy="369332"/>
+          </a:xfrm>
+          <a:prstGeom prst="rect">
+            <a:avLst/>
+          </a:prstGeom>
+          <a:noFill/>
+        </p:spPr>
+        <p:txBody>
+          <a:bodyPr wrap="square" rtlCol="0">
+            <a:spAutoFit/>
+          </a:bodyPr>
+          <a:lstStyle/>
+          <a:p>
+            <a:pPr algn="ctr"/>
+            <a:r>
+              <a:rPr kumimoji="1" lang="ja-JP" altLang="en-US" b="1" dirty="0"/>
+              <a:t>１</a:t>
+            </a:r>
           </a:p>
         </p:txBody>
       </p:sp>
@@ -5977,94 +6519,168 @@
           </a:p>
         </p:txBody>
       </p:sp>
-      <p:cxnSp>
-        <p:nvCxnSpPr>
-          <p:cNvPr id="5" name="直線コネクタ 4">
-            <a:extLst>
-              <a:ext uri="{FF2B5EF4-FFF2-40B4-BE49-F238E27FC236}">
-                <a16:creationId xmlns:a16="http://schemas.microsoft.com/office/drawing/2014/main" id="{650BEA8D-F03E-4F73-A824-96930327D369}"/>
-              </a:ext>
-            </a:extLst>
-          </p:cNvPr>
-          <p:cNvCxnSpPr/>
-          <p:nvPr/>
-        </p:nvCxnSpPr>
-        <p:spPr>
-          <a:xfrm>
-            <a:off x="2716098" y="1909267"/>
-            <a:ext cx="0" cy="2734323"/>
-          </a:xfrm>
-          <a:prstGeom prst="line">
-            <a:avLst/>
-          </a:prstGeom>
-          <a:ln w="25400">
-            <a:solidFill>
-              <a:srgbClr val="FF0000"/>
-            </a:solidFill>
-          </a:ln>
-        </p:spPr>
-        <p:style>
-          <a:lnRef idx="1">
-            <a:schemeClr val="accent1"/>
-          </a:lnRef>
-          <a:fillRef idx="0">
-            <a:schemeClr val="accent1"/>
-          </a:fillRef>
-          <a:effectRef idx="0">
-            <a:schemeClr val="accent1"/>
-          </a:effectRef>
-          <a:fontRef idx="minor">
-            <a:schemeClr val="tx1"/>
-          </a:fontRef>
-        </p:style>
-      </p:cxnSp>
-      <p:cxnSp>
-        <p:nvCxnSpPr>
-          <p:cNvPr id="6" name="直線コネクタ 5">
-            <a:extLst>
-              <a:ext uri="{FF2B5EF4-FFF2-40B4-BE49-F238E27FC236}">
-                <a16:creationId xmlns:a16="http://schemas.microsoft.com/office/drawing/2014/main" id="{D8EE773B-8173-456B-89FB-5E1D2AF7195C}"/>
-              </a:ext>
-            </a:extLst>
-          </p:cNvPr>
-          <p:cNvCxnSpPr/>
-          <p:nvPr/>
-        </p:nvCxnSpPr>
-        <p:spPr>
-          <a:xfrm>
-            <a:off x="2498841" y="3841830"/>
-            <a:ext cx="0" cy="2734323"/>
-          </a:xfrm>
-          <a:prstGeom prst="line">
-            <a:avLst/>
-          </a:prstGeom>
-          <a:ln w="25400">
-            <a:solidFill>
-              <a:srgbClr val="FF0000"/>
-            </a:solidFill>
-          </a:ln>
-        </p:spPr>
-        <p:style>
-          <a:lnRef idx="1">
-            <a:schemeClr val="accent1"/>
-          </a:lnRef>
-          <a:fillRef idx="0">
-            <a:schemeClr val="accent1"/>
-          </a:fillRef>
-          <a:effectRef idx="0">
-            <a:schemeClr val="accent1"/>
-          </a:effectRef>
-          <a:fontRef idx="minor">
-            <a:schemeClr val="tx1"/>
-          </a:fontRef>
-        </p:style>
-      </p:cxnSp>
-      <p:sp>
-        <p:nvSpPr>
-          <p:cNvPr id="9" name="楕円 8">
-            <a:extLst>
-              <a:ext uri="{FF2B5EF4-FFF2-40B4-BE49-F238E27FC236}">
-                <a16:creationId xmlns:a16="http://schemas.microsoft.com/office/drawing/2014/main" id="{9C57689F-5774-4189-B8B4-9128206DFE9D}"/>
+      <p:sp>
+        <p:nvSpPr>
+          <p:cNvPr id="11" name="テキスト ボックス 10">
+            <a:extLst>
+              <a:ext uri="{FF2B5EF4-FFF2-40B4-BE49-F238E27FC236}">
+                <a16:creationId xmlns:a16="http://schemas.microsoft.com/office/drawing/2014/main" id="{CAC710FE-CAD1-4651-B401-34D77A0DBE42}"/>
+              </a:ext>
+            </a:extLst>
+          </p:cNvPr>
+          <p:cNvSpPr txBox="1"/>
+          <p:nvPr/>
+        </p:nvSpPr>
+        <p:spPr>
+          <a:xfrm>
+            <a:off x="6096000" y="1663430"/>
+            <a:ext cx="5830111" cy="2308324"/>
+          </a:xfrm>
+          <a:prstGeom prst="rect">
+            <a:avLst/>
+          </a:prstGeom>
+          <a:noFill/>
+        </p:spPr>
+        <p:txBody>
+          <a:bodyPr wrap="square" rtlCol="0">
+            <a:spAutoFit/>
+          </a:bodyPr>
+          <a:lstStyle/>
+          <a:p>
+            <a:pPr marL="285750" indent="-285750">
+              <a:buFont typeface="Arial" panose="020B0604020202020204" pitchFamily="34" charset="0"/>
+              <a:buChar char="•"/>
+            </a:pPr>
+            <a:r>
+              <a:rPr kumimoji="1" lang="ja-JP" altLang="en-US" dirty="0"/>
+              <a:t>相関の数値が大きい場合ほど、等級が</a:t>
+            </a:r>
+            <a:r>
+              <a:rPr kumimoji="1" lang="en-US" altLang="ja-JP" dirty="0"/>
+              <a:t>1</a:t>
+            </a:r>
+            <a:r>
+              <a:rPr kumimoji="1" lang="ja-JP" altLang="en-US" dirty="0"/>
+              <a:t>と</a:t>
+            </a:r>
+            <a:r>
+              <a:rPr kumimoji="1" lang="en-US" altLang="ja-JP" dirty="0"/>
+              <a:t>3</a:t>
+            </a:r>
+            <a:r>
+              <a:rPr kumimoji="1" lang="ja-JP" altLang="en-US" dirty="0"/>
+              <a:t>の区別はしやすくなるが、間の等級</a:t>
+            </a:r>
+            <a:r>
+              <a:rPr kumimoji="1" lang="en-US" altLang="ja-JP" dirty="0"/>
+              <a:t>2</a:t>
+            </a:r>
+            <a:r>
+              <a:rPr kumimoji="1" lang="ja-JP" altLang="en-US" dirty="0"/>
+              <a:t>のデータは</a:t>
+            </a:r>
+            <a:r>
+              <a:rPr kumimoji="1" lang="en-US" altLang="ja-JP" dirty="0"/>
+              <a:t>1</a:t>
+            </a:r>
+            <a:r>
+              <a:rPr kumimoji="1" lang="ja-JP" altLang="en-US" dirty="0"/>
+              <a:t>と</a:t>
+            </a:r>
+            <a:r>
+              <a:rPr kumimoji="1" lang="en-US" altLang="ja-JP" dirty="0"/>
+              <a:t>3</a:t>
+            </a:r>
+            <a:r>
+              <a:rPr kumimoji="1" lang="ja-JP" altLang="en-US" dirty="0"/>
+              <a:t>両方にまたがるように分布している。</a:t>
+            </a:r>
+            <a:endParaRPr kumimoji="1" lang="en-US" altLang="ja-JP" dirty="0"/>
+          </a:p>
+          <a:p>
+            <a:pPr marL="285750" indent="-285750">
+              <a:buFont typeface="Arial" panose="020B0604020202020204" pitchFamily="34" charset="0"/>
+              <a:buChar char="•"/>
+            </a:pPr>
+            <a:endParaRPr lang="en-US" altLang="ja-JP" dirty="0"/>
+          </a:p>
+          <a:p>
+            <a:pPr marL="285750" indent="-285750">
+              <a:buFont typeface="Arial" panose="020B0604020202020204" pitchFamily="34" charset="0"/>
+              <a:buChar char="•"/>
+            </a:pPr>
+            <a:r>
+              <a:rPr kumimoji="1" lang="ja-JP" altLang="en-US" dirty="0"/>
+              <a:t>等級</a:t>
+            </a:r>
+            <a:r>
+              <a:rPr kumimoji="1" lang="en-US" altLang="ja-JP" dirty="0"/>
+              <a:t>2</a:t>
+            </a:r>
+            <a:r>
+              <a:rPr kumimoji="1" lang="ja-JP" altLang="en-US" dirty="0" err="1"/>
+              <a:t>を抽</a:t>
+            </a:r>
+            <a:r>
+              <a:rPr kumimoji="1" lang="ja-JP" altLang="en-US" dirty="0"/>
+              <a:t>出できそうな属性を調べる必要がある。</a:t>
+            </a:r>
+            <a:endParaRPr kumimoji="1" lang="en-US" altLang="ja-JP" dirty="0"/>
+          </a:p>
+          <a:p>
+            <a:pPr marL="285750" indent="-285750">
+              <a:buFont typeface="Arial" panose="020B0604020202020204" pitchFamily="34" charset="0"/>
+              <a:buChar char="•"/>
+            </a:pPr>
+            <a:endParaRPr lang="en-US" altLang="ja-JP" dirty="0"/>
+          </a:p>
+          <a:p>
+            <a:pPr marL="285750" indent="-285750">
+              <a:buFont typeface="Arial" panose="020B0604020202020204" pitchFamily="34" charset="0"/>
+              <a:buChar char="•"/>
+            </a:pPr>
+            <a:r>
+              <a:rPr kumimoji="1" lang="ja-JP" altLang="en-US" dirty="0"/>
+              <a:t>等級</a:t>
+            </a:r>
+            <a:r>
+              <a:rPr kumimoji="1" lang="en-US" altLang="ja-JP" dirty="0"/>
+              <a:t>3</a:t>
+            </a:r>
+            <a:r>
+              <a:rPr kumimoji="1" lang="ja-JP" altLang="en-US" dirty="0"/>
+              <a:t>を</a:t>
+            </a:r>
+            <a:r>
+              <a:rPr lang="ja-JP" altLang="en-US" dirty="0"/>
+              <a:t>等級</a:t>
+            </a:r>
+            <a:r>
+              <a:rPr lang="en-US" altLang="ja-JP" dirty="0"/>
+              <a:t>1</a:t>
+            </a:r>
+            <a:r>
+              <a:rPr lang="ja-JP" altLang="en-US" dirty="0"/>
+              <a:t>に置き換えてみて、等級</a:t>
+            </a:r>
+            <a:r>
+              <a:rPr lang="en-US" altLang="ja-JP" dirty="0"/>
+              <a:t>2</a:t>
+            </a:r>
+            <a:r>
+              <a:rPr lang="ja-JP" altLang="en-US" dirty="0"/>
+              <a:t>とそれ以外で改めて相関を調べてみる</a:t>
+            </a:r>
+            <a:endParaRPr kumimoji="1" lang="ja-JP" altLang="en-US" dirty="0"/>
+          </a:p>
+        </p:txBody>
+      </p:sp>
+      <p:sp>
+        <p:nvSpPr>
+          <p:cNvPr id="10" name="楕円 9">
+            <a:extLst>
+              <a:ext uri="{FF2B5EF4-FFF2-40B4-BE49-F238E27FC236}">
+                <a16:creationId xmlns:a16="http://schemas.microsoft.com/office/drawing/2014/main" id="{3CE03077-D9F7-4476-8407-ED2B364FF5B0}"/>
               </a:ext>
             </a:extLst>
           </p:cNvPr>
@@ -6073,8 +6689,8 @@
         </p:nvSpPr>
         <p:spPr>
           <a:xfrm>
-            <a:off x="841893" y="3654520"/>
-            <a:ext cx="2645036" cy="914400"/>
+            <a:off x="958789" y="3729986"/>
+            <a:ext cx="2325950" cy="680140"/>
           </a:xfrm>
           <a:prstGeom prst="ellipse">
             <a:avLst/>
@@ -6113,10 +6729,114 @@
       </p:sp>
       <p:sp>
         <p:nvSpPr>
-          <p:cNvPr id="11" name="テキスト ボックス 10">
-            <a:extLst>
-              <a:ext uri="{FF2B5EF4-FFF2-40B4-BE49-F238E27FC236}">
-                <a16:creationId xmlns:a16="http://schemas.microsoft.com/office/drawing/2014/main" id="{CAC710FE-CAD1-4651-B401-34D77A0DBE42}"/>
+          <p:cNvPr id="12" name="楕円 11">
+            <a:extLst>
+              <a:ext uri="{FF2B5EF4-FFF2-40B4-BE49-F238E27FC236}">
+                <a16:creationId xmlns:a16="http://schemas.microsoft.com/office/drawing/2014/main" id="{4133E574-BF79-4544-BB0D-9CD27EF12338}"/>
+              </a:ext>
+            </a:extLst>
+          </p:cNvPr>
+          <p:cNvSpPr/>
+          <p:nvPr/>
+        </p:nvSpPr>
+        <p:spPr>
+          <a:xfrm>
+            <a:off x="1393795" y="2543962"/>
+            <a:ext cx="1624614" cy="698608"/>
+          </a:xfrm>
+          <a:prstGeom prst="ellipse">
+            <a:avLst/>
+          </a:prstGeom>
+          <a:noFill/>
+          <a:ln w="25400">
+            <a:solidFill>
+              <a:srgbClr val="00B050"/>
+            </a:solidFill>
+          </a:ln>
+        </p:spPr>
+        <p:style>
+          <a:lnRef idx="2">
+            <a:schemeClr val="accent1">
+              <a:shade val="50000"/>
+            </a:schemeClr>
+          </a:lnRef>
+          <a:fillRef idx="1">
+            <a:schemeClr val="accent1"/>
+          </a:fillRef>
+          <a:effectRef idx="0">
+            <a:schemeClr val="accent1"/>
+          </a:effectRef>
+          <a:fontRef idx="minor">
+            <a:schemeClr val="lt1"/>
+          </a:fontRef>
+        </p:style>
+        <p:txBody>
+          <a:bodyPr rtlCol="0" anchor="ctr"/>
+          <a:lstStyle/>
+          <a:p>
+            <a:pPr algn="ctr"/>
+            <a:endParaRPr kumimoji="1" lang="ja-JP" altLang="en-US"/>
+          </a:p>
+        </p:txBody>
+      </p:sp>
+      <p:sp>
+        <p:nvSpPr>
+          <p:cNvPr id="13" name="楕円 12">
+            <a:extLst>
+              <a:ext uri="{FF2B5EF4-FFF2-40B4-BE49-F238E27FC236}">
+                <a16:creationId xmlns:a16="http://schemas.microsoft.com/office/drawing/2014/main" id="{8B7270EC-C0EE-4CF0-83A1-57B5A58144E4}"/>
+              </a:ext>
+            </a:extLst>
+          </p:cNvPr>
+          <p:cNvSpPr/>
+          <p:nvPr/>
+        </p:nvSpPr>
+        <p:spPr>
+          <a:xfrm>
+            <a:off x="2139518" y="4739593"/>
+            <a:ext cx="3266983" cy="826706"/>
+          </a:xfrm>
+          <a:prstGeom prst="ellipse">
+            <a:avLst/>
+          </a:prstGeom>
+          <a:noFill/>
+          <a:ln w="25400">
+            <a:solidFill>
+              <a:srgbClr val="00B050"/>
+            </a:solidFill>
+          </a:ln>
+        </p:spPr>
+        <p:style>
+          <a:lnRef idx="2">
+            <a:schemeClr val="accent1">
+              <a:shade val="50000"/>
+            </a:schemeClr>
+          </a:lnRef>
+          <a:fillRef idx="1">
+            <a:schemeClr val="accent1"/>
+          </a:fillRef>
+          <a:effectRef idx="0">
+            <a:schemeClr val="accent1"/>
+          </a:effectRef>
+          <a:fontRef idx="minor">
+            <a:schemeClr val="lt1"/>
+          </a:fontRef>
+        </p:style>
+        <p:txBody>
+          <a:bodyPr rtlCol="0" anchor="ctr"/>
+          <a:lstStyle/>
+          <a:p>
+            <a:pPr algn="ctr"/>
+            <a:endParaRPr kumimoji="1" lang="ja-JP" altLang="en-US"/>
+          </a:p>
+        </p:txBody>
+      </p:sp>
+      <p:sp>
+        <p:nvSpPr>
+          <p:cNvPr id="14" name="テキスト ボックス 13">
+            <a:extLst>
+              <a:ext uri="{FF2B5EF4-FFF2-40B4-BE49-F238E27FC236}">
+                <a16:creationId xmlns:a16="http://schemas.microsoft.com/office/drawing/2014/main" id="{AF188D0F-7E85-4D57-A41E-2C2E12C15383}"/>
               </a:ext>
             </a:extLst>
           </p:cNvPr>
@@ -6125,8 +6845,45 @@
         </p:nvSpPr>
         <p:spPr>
           <a:xfrm>
-            <a:off x="6096000" y="1663430"/>
-            <a:ext cx="5830111" cy="2308324"/>
+            <a:off x="2318954" y="2263298"/>
+            <a:ext cx="317715" cy="369332"/>
+          </a:xfrm>
+          <a:prstGeom prst="rect">
+            <a:avLst/>
+          </a:prstGeom>
+          <a:noFill/>
+        </p:spPr>
+        <p:txBody>
+          <a:bodyPr wrap="none" rtlCol="0">
+            <a:spAutoFit/>
+          </a:bodyPr>
+          <a:lstStyle/>
+          <a:p>
+            <a:pPr algn="ctr"/>
+            <a:r>
+              <a:rPr kumimoji="1" lang="en-US" altLang="ja-JP" b="1" dirty="0"/>
+              <a:t>3</a:t>
+            </a:r>
+            <a:endParaRPr kumimoji="1" lang="ja-JP" altLang="en-US" b="1" dirty="0"/>
+          </a:p>
+        </p:txBody>
+      </p:sp>
+      <p:sp>
+        <p:nvSpPr>
+          <p:cNvPr id="15" name="テキスト ボックス 14">
+            <a:extLst>
+              <a:ext uri="{FF2B5EF4-FFF2-40B4-BE49-F238E27FC236}">
+                <a16:creationId xmlns:a16="http://schemas.microsoft.com/office/drawing/2014/main" id="{F441EF97-B90F-4888-8DD7-72A6AE9F2ADF}"/>
+              </a:ext>
+            </a:extLst>
+          </p:cNvPr>
+          <p:cNvSpPr txBox="1"/>
+          <p:nvPr/>
+        </p:nvSpPr>
+        <p:spPr>
+          <a:xfrm>
+            <a:off x="3041319" y="3534935"/>
+            <a:ext cx="395784" cy="369332"/>
           </a:xfrm>
           <a:prstGeom prst="rect">
             <a:avLst/>
@@ -6139,131 +6896,48 @@
           </a:bodyPr>
           <a:lstStyle/>
           <a:p>
-            <a:pPr marL="285750" indent="-285750">
-              <a:buFont typeface="Arial" panose="020B0604020202020204" pitchFamily="34" charset="0"/>
-              <a:buChar char="•"/>
-            </a:pPr>
-            <a:r>
-              <a:rPr kumimoji="1" lang="ja-JP" altLang="en-US" dirty="0"/>
-              <a:t>相関の数値が大きい場合ほど、等級が</a:t>
-            </a:r>
-            <a:r>
-              <a:rPr kumimoji="1" lang="en-US" altLang="ja-JP" dirty="0"/>
-              <a:t>1</a:t>
-            </a:r>
-            <a:r>
-              <a:rPr kumimoji="1" lang="ja-JP" altLang="en-US" dirty="0"/>
-              <a:t>と</a:t>
-            </a:r>
-            <a:r>
-              <a:rPr kumimoji="1" lang="en-US" altLang="ja-JP" dirty="0"/>
-              <a:t>3</a:t>
-            </a:r>
-            <a:r>
-              <a:rPr kumimoji="1" lang="ja-JP" altLang="en-US" dirty="0"/>
-              <a:t>の区別はしやすくなるが、間の等級</a:t>
-            </a:r>
-            <a:r>
-              <a:rPr kumimoji="1" lang="en-US" altLang="ja-JP" dirty="0"/>
-              <a:t>2</a:t>
-            </a:r>
-            <a:r>
-              <a:rPr kumimoji="1" lang="ja-JP" altLang="en-US" dirty="0"/>
-              <a:t>のデータは</a:t>
-            </a:r>
-            <a:r>
-              <a:rPr kumimoji="1" lang="en-US" altLang="ja-JP" dirty="0"/>
-              <a:t>1</a:t>
-            </a:r>
-            <a:r>
-              <a:rPr kumimoji="1" lang="ja-JP" altLang="en-US" dirty="0"/>
-              <a:t>と</a:t>
-            </a:r>
-            <a:r>
-              <a:rPr kumimoji="1" lang="en-US" altLang="ja-JP" dirty="0"/>
-              <a:t>3</a:t>
-            </a:r>
-            <a:r>
-              <a:rPr kumimoji="1" lang="ja-JP" altLang="en-US" dirty="0"/>
-              <a:t>両方にまたがるように分布している。</a:t>
-            </a:r>
-            <a:endParaRPr kumimoji="1" lang="en-US" altLang="ja-JP" dirty="0"/>
-          </a:p>
-          <a:p>
-            <a:pPr marL="285750" indent="-285750">
-              <a:buFont typeface="Arial" panose="020B0604020202020204" pitchFamily="34" charset="0"/>
-              <a:buChar char="•"/>
-            </a:pPr>
-            <a:endParaRPr lang="en-US" altLang="ja-JP" dirty="0"/>
-          </a:p>
-          <a:p>
-            <a:pPr marL="285750" indent="-285750">
-              <a:buFont typeface="Arial" panose="020B0604020202020204" pitchFamily="34" charset="0"/>
-              <a:buChar char="•"/>
-            </a:pPr>
-            <a:r>
-              <a:rPr kumimoji="1" lang="ja-JP" altLang="en-US" dirty="0"/>
-              <a:t>等級</a:t>
-            </a:r>
-            <a:r>
-              <a:rPr kumimoji="1" lang="en-US" altLang="ja-JP" dirty="0"/>
-              <a:t>2</a:t>
-            </a:r>
-            <a:r>
-              <a:rPr kumimoji="1" lang="ja-JP" altLang="en-US" dirty="0" err="1"/>
-              <a:t>を抽</a:t>
-            </a:r>
-            <a:r>
-              <a:rPr kumimoji="1" lang="ja-JP" altLang="en-US" dirty="0"/>
-              <a:t>出できそうな属性を調べる必要がある。</a:t>
-            </a:r>
-            <a:endParaRPr kumimoji="1" lang="en-US" altLang="ja-JP" dirty="0"/>
-          </a:p>
-          <a:p>
-            <a:pPr marL="285750" indent="-285750">
-              <a:buFont typeface="Arial" panose="020B0604020202020204" pitchFamily="34" charset="0"/>
-              <a:buChar char="•"/>
-            </a:pPr>
-            <a:endParaRPr lang="en-US" altLang="ja-JP" dirty="0"/>
-          </a:p>
-          <a:p>
-            <a:pPr marL="285750" indent="-285750">
-              <a:buFont typeface="Arial" panose="020B0604020202020204" pitchFamily="34" charset="0"/>
-              <a:buChar char="•"/>
-            </a:pPr>
-            <a:r>
-              <a:rPr kumimoji="1" lang="ja-JP" altLang="en-US" dirty="0"/>
-              <a:t>等級</a:t>
-            </a:r>
-            <a:r>
-              <a:rPr kumimoji="1" lang="en-US" altLang="ja-JP" dirty="0"/>
-              <a:t>3</a:t>
-            </a:r>
-            <a:r>
-              <a:rPr kumimoji="1" lang="ja-JP" altLang="en-US" dirty="0"/>
-              <a:t>を</a:t>
-            </a:r>
-            <a:r>
-              <a:rPr lang="ja-JP" altLang="en-US" dirty="0"/>
-              <a:t>等級</a:t>
-            </a:r>
-            <a:r>
-              <a:rPr lang="en-US" altLang="ja-JP" dirty="0"/>
-              <a:t>1</a:t>
-            </a:r>
-            <a:r>
-              <a:rPr lang="ja-JP" altLang="en-US" dirty="0"/>
-              <a:t>に置き換えてみて、等級</a:t>
-            </a:r>
-            <a:r>
-              <a:rPr lang="en-US" altLang="ja-JP" dirty="0"/>
-              <a:t>2</a:t>
-            </a:r>
-            <a:r>
-              <a:rPr lang="ja-JP" altLang="en-US" dirty="0"/>
-              <a:t>とそれ以外で改めて相関を調べてみる</a:t>
-            </a:r>
-            <a:endParaRPr kumimoji="1" lang="ja-JP" altLang="en-US" dirty="0"/>
+            <a:pPr algn="ctr"/>
+            <a:r>
+              <a:rPr lang="ja-JP" altLang="en-US" b="1" dirty="0"/>
+              <a:t>２</a:t>
+            </a:r>
+            <a:endParaRPr kumimoji="1" lang="ja-JP" altLang="en-US" b="1" dirty="0"/>
+          </a:p>
+        </p:txBody>
+      </p:sp>
+      <p:sp>
+        <p:nvSpPr>
+          <p:cNvPr id="16" name="テキスト ボックス 15">
+            <a:extLst>
+              <a:ext uri="{FF2B5EF4-FFF2-40B4-BE49-F238E27FC236}">
+                <a16:creationId xmlns:a16="http://schemas.microsoft.com/office/drawing/2014/main" id="{D8E9AD28-EBB0-48F1-BE51-6529A2D7C28B}"/>
+              </a:ext>
+            </a:extLst>
+          </p:cNvPr>
+          <p:cNvSpPr txBox="1"/>
+          <p:nvPr/>
+        </p:nvSpPr>
+        <p:spPr>
+          <a:xfrm>
+            <a:off x="3898832" y="5576684"/>
+            <a:ext cx="384645" cy="369332"/>
+          </a:xfrm>
+          <a:prstGeom prst="rect">
+            <a:avLst/>
+          </a:prstGeom>
+          <a:noFill/>
+        </p:spPr>
+        <p:txBody>
+          <a:bodyPr wrap="square" rtlCol="0">
+            <a:spAutoFit/>
+          </a:bodyPr>
+          <a:lstStyle/>
+          <a:p>
+            <a:pPr algn="ctr"/>
+            <a:r>
+              <a:rPr kumimoji="1" lang="ja-JP" altLang="en-US" b="1" dirty="0"/>
+              <a:t>１</a:t>
+            </a:r>
           </a:p>
         </p:txBody>
       </p:sp>
@@ -10796,6 +11470,197 @@
 </p:sld>
 </file>
 
+<file path=ppt/slides/slide29.xml><?xml version="1.0" encoding="utf-8"?>
+<p:sld xmlns:a="http://schemas.openxmlformats.org/drawingml/2006/main" xmlns:r="http://schemas.openxmlformats.org/officeDocument/2006/relationships" xmlns:p="http://schemas.openxmlformats.org/presentationml/2006/main">
+  <p:cSld>
+    <p:spTree>
+      <p:nvGrpSpPr>
+        <p:cNvPr id="1" name=""/>
+        <p:cNvGrpSpPr/>
+        <p:nvPr/>
+      </p:nvGrpSpPr>
+      <p:grpSpPr>
+        <a:xfrm>
+          <a:off x="0" y="0"/>
+          <a:ext cx="0" cy="0"/>
+          <a:chOff x="0" y="0"/>
+          <a:chExt cx="0" cy="0"/>
+        </a:xfrm>
+      </p:grpSpPr>
+      <p:pic>
+        <p:nvPicPr>
+          <p:cNvPr id="2" name="図 1">
+            <a:extLst>
+              <a:ext uri="{FF2B5EF4-FFF2-40B4-BE49-F238E27FC236}">
+                <a16:creationId xmlns:a16="http://schemas.microsoft.com/office/drawing/2014/main" id="{A3602F44-407F-43C4-8EA1-FAEC42CE27DA}"/>
+              </a:ext>
+            </a:extLst>
+          </p:cNvPr>
+          <p:cNvPicPr>
+            <a:picLocks noChangeAspect="1"/>
+          </p:cNvPicPr>
+          <p:nvPr/>
+        </p:nvPicPr>
+        <p:blipFill>
+          <a:blip r:embed="rId2"/>
+          <a:stretch>
+            <a:fillRect/>
+          </a:stretch>
+        </p:blipFill>
+        <p:spPr>
+          <a:xfrm>
+            <a:off x="506855" y="790112"/>
+            <a:ext cx="6659161" cy="5419817"/>
+          </a:xfrm>
+          <a:prstGeom prst="rect">
+            <a:avLst/>
+          </a:prstGeom>
+        </p:spPr>
+      </p:pic>
+      <p:sp>
+        <p:nvSpPr>
+          <p:cNvPr id="3" name="テキスト ボックス 2">
+            <a:extLst>
+              <a:ext uri="{FF2B5EF4-FFF2-40B4-BE49-F238E27FC236}">
+                <a16:creationId xmlns:a16="http://schemas.microsoft.com/office/drawing/2014/main" id="{535C4C2B-6AC6-4BEB-B826-BE11F7DD1075}"/>
+              </a:ext>
+            </a:extLst>
+          </p:cNvPr>
+          <p:cNvSpPr txBox="1"/>
+          <p:nvPr/>
+        </p:nvSpPr>
+        <p:spPr>
+          <a:xfrm flipH="1">
+            <a:off x="7412854" y="1340528"/>
+            <a:ext cx="4429958" cy="3139321"/>
+          </a:xfrm>
+          <a:prstGeom prst="rect">
+            <a:avLst/>
+          </a:prstGeom>
+          <a:noFill/>
+        </p:spPr>
+        <p:txBody>
+          <a:bodyPr wrap="square" rtlCol="0">
+            <a:spAutoFit/>
+          </a:bodyPr>
+          <a:lstStyle/>
+          <a:p>
+            <a:r>
+              <a:rPr kumimoji="1" lang="en-US" altLang="ja-JP" dirty="0"/>
+              <a:t>Seaborn</a:t>
+            </a:r>
+            <a:r>
+              <a:rPr kumimoji="1" lang="ja-JP" altLang="en-US" dirty="0"/>
+              <a:t>で</a:t>
+            </a:r>
+            <a:r>
+              <a:rPr lang="ja-JP" altLang="en-US" dirty="0"/>
+              <a:t>色彩強度</a:t>
+            </a:r>
+            <a:r>
+              <a:rPr lang="en-US" altLang="ja-JP" dirty="0"/>
+              <a:t>(Color intensity)</a:t>
+            </a:r>
+            <a:r>
+              <a:rPr lang="ja-JP" altLang="en-US" dirty="0"/>
+              <a:t>とプロリン</a:t>
+            </a:r>
+            <a:r>
+              <a:rPr lang="en-US" altLang="ja-JP" dirty="0"/>
+              <a:t>(Proline)</a:t>
+            </a:r>
+            <a:r>
+              <a:rPr lang="ja-JP" altLang="en-US" dirty="0"/>
+              <a:t>の関係性をプロット</a:t>
+            </a:r>
+            <a:endParaRPr lang="en-US" altLang="ja-JP" dirty="0"/>
+          </a:p>
+          <a:p>
+            <a:endParaRPr lang="en-US" altLang="ja-JP" dirty="0"/>
+          </a:p>
+          <a:p>
+            <a:r>
+              <a:rPr lang="en-US" altLang="ja-JP" dirty="0"/>
+              <a:t>import seaborn as </a:t>
+            </a:r>
+            <a:r>
+              <a:rPr lang="en-US" altLang="ja-JP" dirty="0" err="1"/>
+              <a:t>sbn</a:t>
+            </a:r>
+            <a:endParaRPr lang="en-US" altLang="ja-JP" dirty="0"/>
+          </a:p>
+          <a:p>
+            <a:endParaRPr lang="en-US" altLang="ja-JP" dirty="0"/>
+          </a:p>
+          <a:p>
+            <a:r>
+              <a:rPr lang="en-US" altLang="ja-JP" dirty="0" err="1"/>
+              <a:t>sbn.pairplot</a:t>
+            </a:r>
+            <a:r>
+              <a:rPr lang="en-US" altLang="ja-JP" dirty="0"/>
+              <a:t>(</a:t>
+            </a:r>
+            <a:r>
+              <a:rPr lang="en-US" altLang="ja-JP" dirty="0" err="1"/>
+              <a:t>dataframe</a:t>
+            </a:r>
+            <a:r>
+              <a:rPr lang="en-US" altLang="ja-JP" dirty="0"/>
+              <a:t>, hue=‘</a:t>
+            </a:r>
+            <a:r>
+              <a:rPr lang="ja-JP" altLang="en-US" dirty="0"/>
+              <a:t>カラム名</a:t>
+            </a:r>
+            <a:r>
+              <a:rPr lang="en-US" altLang="ja-JP" dirty="0"/>
+              <a:t>’)</a:t>
+            </a:r>
+          </a:p>
+          <a:p>
+            <a:endParaRPr kumimoji="1" lang="en-US" altLang="ja-JP" dirty="0"/>
+          </a:p>
+          <a:p>
+            <a:r>
+              <a:rPr lang="ja-JP" altLang="en-US" dirty="0"/>
+              <a:t>等級</a:t>
+            </a:r>
+            <a:r>
+              <a:rPr lang="en-US" altLang="ja-JP" dirty="0"/>
+              <a:t>(Class)</a:t>
+            </a:r>
+            <a:r>
+              <a:rPr lang="ja-JP" altLang="en-US" dirty="0"/>
+              <a:t>の値で色分け</a:t>
+            </a:r>
+            <a:endParaRPr lang="en-US" altLang="ja-JP" dirty="0"/>
+          </a:p>
+          <a:p>
+            <a:endParaRPr kumimoji="1" lang="en-US" altLang="ja-JP" dirty="0"/>
+          </a:p>
+          <a:p>
+            <a:r>
+              <a:rPr lang="ja-JP" altLang="en-US" dirty="0"/>
+              <a:t>複数のデータ間の各組合せにおける相関をまとめて可視化できる</a:t>
+            </a:r>
+            <a:endParaRPr lang="en-US" altLang="ja-JP" dirty="0"/>
+          </a:p>
+        </p:txBody>
+      </p:sp>
+    </p:spTree>
+    <p:extLst>
+      <p:ext uri="{BB962C8B-B14F-4D97-AF65-F5344CB8AC3E}">
+        <p14:creationId xmlns:p14="http://schemas.microsoft.com/office/powerpoint/2010/main" val="3151704089"/>
+      </p:ext>
+    </p:extLst>
+  </p:cSld>
+  <p:clrMapOvr>
+    <a:masterClrMapping/>
+  </p:clrMapOvr>
+</p:sld>
+</file>
+
 <file path=ppt/slides/slide3.xml><?xml version="1.0" encoding="utf-8"?>
 <p:sld xmlns:a="http://schemas.openxmlformats.org/drawingml/2006/main" xmlns:r="http://schemas.openxmlformats.org/officeDocument/2006/relationships" xmlns:p="http://schemas.openxmlformats.org/presentationml/2006/main">
   <p:cSld>
@@ -11133,6 +11998,1268 @@
     <p:extLst>
       <p:ext uri="{BB962C8B-B14F-4D97-AF65-F5344CB8AC3E}">
         <p14:creationId xmlns:p14="http://schemas.microsoft.com/office/powerpoint/2010/main" val="3675701605"/>
+      </p:ext>
+    </p:extLst>
+  </p:cSld>
+  <p:clrMapOvr>
+    <a:masterClrMapping/>
+  </p:clrMapOvr>
+</p:sld>
+</file>
+
+<file path=ppt/slides/slide30.xml><?xml version="1.0" encoding="utf-8"?>
+<p:sld xmlns:a="http://schemas.openxmlformats.org/drawingml/2006/main" xmlns:r="http://schemas.openxmlformats.org/officeDocument/2006/relationships" xmlns:p="http://schemas.openxmlformats.org/presentationml/2006/main">
+  <p:cSld>
+    <p:spTree>
+      <p:nvGrpSpPr>
+        <p:cNvPr id="1" name=""/>
+        <p:cNvGrpSpPr/>
+        <p:nvPr/>
+      </p:nvGrpSpPr>
+      <p:grpSpPr>
+        <a:xfrm>
+          <a:off x="0" y="0"/>
+          <a:ext cx="0" cy="0"/>
+          <a:chOff x="0" y="0"/>
+          <a:chExt cx="0" cy="0"/>
+        </a:xfrm>
+      </p:grpSpPr>
+      <p:sp>
+        <p:nvSpPr>
+          <p:cNvPr id="2" name="テキスト ボックス 1">
+            <a:extLst>
+              <a:ext uri="{FF2B5EF4-FFF2-40B4-BE49-F238E27FC236}">
+                <a16:creationId xmlns:a16="http://schemas.microsoft.com/office/drawing/2014/main" id="{4BCD2A6F-8D52-46F0-AA47-81D8A2E64D2D}"/>
+              </a:ext>
+            </a:extLst>
+          </p:cNvPr>
+          <p:cNvSpPr txBox="1"/>
+          <p:nvPr/>
+        </p:nvSpPr>
+        <p:spPr>
+          <a:xfrm>
+            <a:off x="355107" y="186432"/>
+            <a:ext cx="4261282" cy="369332"/>
+          </a:xfrm>
+          <a:prstGeom prst="rect">
+            <a:avLst/>
+          </a:prstGeom>
+          <a:noFill/>
+        </p:spPr>
+        <p:txBody>
+          <a:bodyPr wrap="square" rtlCol="0">
+            <a:spAutoFit/>
+          </a:bodyPr>
+          <a:lstStyle/>
+          <a:p>
+            <a:pPr algn="ctr"/>
+            <a:r>
+              <a:rPr lang="ja-JP" altLang="en-US" dirty="0"/>
+              <a:t>データの正規化、標準化について</a:t>
+            </a:r>
+            <a:endParaRPr kumimoji="1" lang="ja-JP" altLang="en-US" dirty="0"/>
+          </a:p>
+        </p:txBody>
+      </p:sp>
+      <p:sp>
+        <p:nvSpPr>
+          <p:cNvPr id="3" name="テキスト ボックス 2">
+            <a:extLst>
+              <a:ext uri="{FF2B5EF4-FFF2-40B4-BE49-F238E27FC236}">
+                <a16:creationId xmlns:a16="http://schemas.microsoft.com/office/drawing/2014/main" id="{F8B11F84-7527-44AA-98CB-22164949A066}"/>
+              </a:ext>
+            </a:extLst>
+          </p:cNvPr>
+          <p:cNvSpPr txBox="1"/>
+          <p:nvPr/>
+        </p:nvSpPr>
+        <p:spPr>
+          <a:xfrm>
+            <a:off x="125767" y="818227"/>
+            <a:ext cx="11841332" cy="646331"/>
+          </a:xfrm>
+          <a:prstGeom prst="rect">
+            <a:avLst/>
+          </a:prstGeom>
+          <a:noFill/>
+        </p:spPr>
+        <p:txBody>
+          <a:bodyPr wrap="square" rtlCol="0">
+            <a:spAutoFit/>
+          </a:bodyPr>
+          <a:lstStyle/>
+          <a:p>
+            <a:r>
+              <a:rPr kumimoji="1" lang="ja-JP" altLang="en-US" dirty="0"/>
+              <a:t>データを一定の方法で変形し、次元が違うものに対しても、なんとかして同じような単位で取り扱えるようにして、計算や比較しやすくしよう</a:t>
+            </a:r>
+          </a:p>
+        </p:txBody>
+      </p:sp>
+      <p:sp>
+        <p:nvSpPr>
+          <p:cNvPr id="4" name="テキスト ボックス 3">
+            <a:extLst>
+              <a:ext uri="{FF2B5EF4-FFF2-40B4-BE49-F238E27FC236}">
+                <a16:creationId xmlns:a16="http://schemas.microsoft.com/office/drawing/2014/main" id="{1FA1607B-EC3A-4CC8-A300-681DCBD485C3}"/>
+              </a:ext>
+            </a:extLst>
+          </p:cNvPr>
+          <p:cNvSpPr txBox="1"/>
+          <p:nvPr/>
+        </p:nvSpPr>
+        <p:spPr>
+          <a:xfrm>
+            <a:off x="127247" y="1814005"/>
+            <a:ext cx="11841332" cy="3139321"/>
+          </a:xfrm>
+          <a:prstGeom prst="rect">
+            <a:avLst/>
+          </a:prstGeom>
+          <a:noFill/>
+        </p:spPr>
+        <p:txBody>
+          <a:bodyPr wrap="square" rtlCol="0">
+            <a:spAutoFit/>
+          </a:bodyPr>
+          <a:lstStyle/>
+          <a:p>
+            <a:r>
+              <a:rPr lang="en-US" altLang="ja-JP" dirty="0"/>
+              <a:t>z-score</a:t>
+            </a:r>
+            <a:r>
+              <a:rPr lang="ja-JP" altLang="en-US" dirty="0"/>
+              <a:t> </a:t>
+            </a:r>
+            <a:r>
+              <a:rPr lang="en-US" altLang="ja-JP" dirty="0"/>
+              <a:t>normalization(</a:t>
+            </a:r>
+            <a:r>
+              <a:rPr lang="ja-JP" altLang="en-US" dirty="0"/>
+              <a:t>標準化</a:t>
+            </a:r>
+            <a:r>
+              <a:rPr lang="en-US" altLang="ja-JP" dirty="0"/>
+              <a:t>)</a:t>
+            </a:r>
+          </a:p>
+          <a:p>
+            <a:r>
+              <a:rPr lang="ja-JP" altLang="en-US" dirty="0"/>
+              <a:t>元データを平均を</a:t>
+            </a:r>
+            <a:r>
+              <a:rPr lang="en-US" altLang="ja-JP" dirty="0"/>
+              <a:t>0</a:t>
+            </a:r>
+            <a:r>
+              <a:rPr lang="ja-JP" altLang="en-US" dirty="0" err="1"/>
+              <a:t>、</a:t>
+            </a:r>
+            <a:r>
+              <a:rPr lang="ja-JP" altLang="en-US" dirty="0"/>
+              <a:t>標準偏差を</a:t>
+            </a:r>
+            <a:r>
+              <a:rPr lang="en-US" altLang="ja-JP" dirty="0"/>
+              <a:t>1</a:t>
+            </a:r>
+            <a:r>
+              <a:rPr lang="ja-JP" altLang="en-US" dirty="0"/>
+              <a:t>のものに変換する手法</a:t>
+            </a:r>
+            <a:endParaRPr lang="en-US" altLang="ja-JP" dirty="0"/>
+          </a:p>
+          <a:p>
+            <a:r>
+              <a:rPr kumimoji="1" lang="ja-JP" altLang="en-US" dirty="0"/>
+              <a:t>外れ値のあるデータに対して有効</a:t>
+            </a:r>
+            <a:endParaRPr kumimoji="1" lang="en-US" altLang="ja-JP" dirty="0"/>
+          </a:p>
+          <a:p>
+            <a:r>
+              <a:rPr lang="ja-JP" altLang="en-US" dirty="0"/>
+              <a:t>最大値、最小値に上限、下限がない場合に使うと良い</a:t>
+            </a:r>
+            <a:endParaRPr lang="en-US" altLang="ja-JP" dirty="0"/>
+          </a:p>
+          <a:p>
+            <a:r>
+              <a:rPr kumimoji="1" lang="ja-JP" altLang="en-US" dirty="0"/>
+              <a:t>データの分布形状がガウス分布になっていること</a:t>
+            </a:r>
+            <a:endParaRPr kumimoji="1" lang="en-US" altLang="ja-JP" dirty="0"/>
+          </a:p>
+          <a:p>
+            <a:endParaRPr lang="en-US" altLang="ja-JP" dirty="0"/>
+          </a:p>
+          <a:p>
+            <a:r>
+              <a:rPr kumimoji="1" lang="en-US" altLang="ja-JP" dirty="0"/>
+              <a:t>Min-Max normalization</a:t>
+            </a:r>
+          </a:p>
+          <a:p>
+            <a:r>
+              <a:rPr lang="ja-JP" altLang="en-US" dirty="0"/>
+              <a:t>最小値を</a:t>
+            </a:r>
+            <a:r>
+              <a:rPr lang="en-US" altLang="ja-JP" dirty="0"/>
+              <a:t>0</a:t>
+            </a:r>
+            <a:r>
+              <a:rPr lang="ja-JP" altLang="en-US" dirty="0" err="1"/>
+              <a:t>、</a:t>
+            </a:r>
+            <a:r>
+              <a:rPr lang="ja-JP" altLang="en-US" dirty="0"/>
+              <a:t>最大値を</a:t>
+            </a:r>
+            <a:r>
+              <a:rPr lang="en-US" altLang="ja-JP" dirty="0"/>
+              <a:t>1</a:t>
+            </a:r>
+            <a:r>
+              <a:rPr lang="ja-JP" altLang="en-US" dirty="0"/>
+              <a:t>とする正規化</a:t>
+            </a:r>
+            <a:endParaRPr lang="en-US" altLang="ja-JP" dirty="0"/>
+          </a:p>
+          <a:p>
+            <a:r>
+              <a:rPr kumimoji="1" lang="ja-JP" altLang="en-US" dirty="0"/>
+              <a:t>最大値と最小値が予め決まっている様な場合に有効</a:t>
+            </a:r>
+            <a:endParaRPr kumimoji="1" lang="en-US" altLang="ja-JP" dirty="0"/>
+          </a:p>
+          <a:p>
+            <a:r>
+              <a:rPr lang="ja-JP" altLang="en-US" dirty="0"/>
+              <a:t>外れ値が存在していないこと</a:t>
+            </a:r>
+            <a:r>
+              <a:rPr lang="en-US" altLang="ja-JP" dirty="0"/>
+              <a:t>(</a:t>
+            </a:r>
+            <a:r>
+              <a:rPr lang="ja-JP" altLang="en-US" dirty="0"/>
+              <a:t>引っ張られて正規化できない</a:t>
+            </a:r>
+            <a:r>
+              <a:rPr lang="en-US" altLang="ja-JP" dirty="0"/>
+              <a:t>)</a:t>
+            </a:r>
+          </a:p>
+          <a:p>
+            <a:r>
+              <a:rPr kumimoji="1" lang="ja-JP" altLang="en-US" dirty="0"/>
+              <a:t>データが一様分布であること</a:t>
+            </a:r>
+          </a:p>
+        </p:txBody>
+      </p:sp>
+    </p:spTree>
+    <p:extLst>
+      <p:ext uri="{BB962C8B-B14F-4D97-AF65-F5344CB8AC3E}">
+        <p14:creationId xmlns:p14="http://schemas.microsoft.com/office/powerpoint/2010/main" val="1570179686"/>
+      </p:ext>
+    </p:extLst>
+  </p:cSld>
+  <p:clrMapOvr>
+    <a:masterClrMapping/>
+  </p:clrMapOvr>
+</p:sld>
+</file>
+
+<file path=ppt/slides/slide31.xml><?xml version="1.0" encoding="utf-8"?>
+<p:sld xmlns:a="http://schemas.openxmlformats.org/drawingml/2006/main" xmlns:r="http://schemas.openxmlformats.org/officeDocument/2006/relationships" xmlns:p="http://schemas.openxmlformats.org/presentationml/2006/main">
+  <p:cSld>
+    <p:spTree>
+      <p:nvGrpSpPr>
+        <p:cNvPr id="1" name=""/>
+        <p:cNvGrpSpPr/>
+        <p:nvPr/>
+      </p:nvGrpSpPr>
+      <p:grpSpPr>
+        <a:xfrm>
+          <a:off x="0" y="0"/>
+          <a:ext cx="0" cy="0"/>
+          <a:chOff x="0" y="0"/>
+          <a:chExt cx="0" cy="0"/>
+        </a:xfrm>
+      </p:grpSpPr>
+      <p:pic>
+        <p:nvPicPr>
+          <p:cNvPr id="2" name="図 1">
+            <a:extLst>
+              <a:ext uri="{FF2B5EF4-FFF2-40B4-BE49-F238E27FC236}">
+                <a16:creationId xmlns:a16="http://schemas.microsoft.com/office/drawing/2014/main" id="{8A4DB3F5-3A08-40CB-8847-348B095F9BBC}"/>
+              </a:ext>
+            </a:extLst>
+          </p:cNvPr>
+          <p:cNvPicPr>
+            <a:picLocks noChangeAspect="1"/>
+          </p:cNvPicPr>
+          <p:nvPr/>
+        </p:nvPicPr>
+        <p:blipFill>
+          <a:blip r:embed="rId2"/>
+          <a:stretch>
+            <a:fillRect/>
+          </a:stretch>
+        </p:blipFill>
+        <p:spPr>
+          <a:xfrm>
+            <a:off x="727971" y="898072"/>
+            <a:ext cx="10875146" cy="5759232"/>
+          </a:xfrm>
+          <a:prstGeom prst="rect">
+            <a:avLst/>
+          </a:prstGeom>
+        </p:spPr>
+      </p:pic>
+      <p:sp>
+        <p:nvSpPr>
+          <p:cNvPr id="3" name="テキスト ボックス 2">
+            <a:extLst>
+              <a:ext uri="{FF2B5EF4-FFF2-40B4-BE49-F238E27FC236}">
+                <a16:creationId xmlns:a16="http://schemas.microsoft.com/office/drawing/2014/main" id="{C0369775-CE45-44B2-A39E-DB48F022168E}"/>
+              </a:ext>
+            </a:extLst>
+          </p:cNvPr>
+          <p:cNvSpPr txBox="1"/>
+          <p:nvPr/>
+        </p:nvSpPr>
+        <p:spPr>
+          <a:xfrm>
+            <a:off x="1420427" y="408373"/>
+            <a:ext cx="4261282" cy="369332"/>
+          </a:xfrm>
+          <a:prstGeom prst="rect">
+            <a:avLst/>
+          </a:prstGeom>
+          <a:noFill/>
+        </p:spPr>
+        <p:txBody>
+          <a:bodyPr wrap="square" rtlCol="0">
+            <a:spAutoFit/>
+          </a:bodyPr>
+          <a:lstStyle/>
+          <a:p>
+            <a:pPr algn="ctr"/>
+            <a:r>
+              <a:rPr kumimoji="1" lang="ja-JP" altLang="en-US" dirty="0"/>
+              <a:t>プロリンの数値の分布</a:t>
+            </a:r>
+          </a:p>
+        </p:txBody>
+      </p:sp>
+      <p:sp>
+        <p:nvSpPr>
+          <p:cNvPr id="4" name="テキスト ボックス 3">
+            <a:extLst>
+              <a:ext uri="{FF2B5EF4-FFF2-40B4-BE49-F238E27FC236}">
+                <a16:creationId xmlns:a16="http://schemas.microsoft.com/office/drawing/2014/main" id="{399327E4-D65C-4EBF-A6D4-8CB0F8EB5118}"/>
+              </a:ext>
+            </a:extLst>
+          </p:cNvPr>
+          <p:cNvSpPr txBox="1"/>
+          <p:nvPr/>
+        </p:nvSpPr>
+        <p:spPr>
+          <a:xfrm>
+            <a:off x="7032608" y="409848"/>
+            <a:ext cx="4261282" cy="369332"/>
+          </a:xfrm>
+          <a:prstGeom prst="rect">
+            <a:avLst/>
+          </a:prstGeom>
+          <a:noFill/>
+        </p:spPr>
+        <p:txBody>
+          <a:bodyPr wrap="square" rtlCol="0">
+            <a:spAutoFit/>
+          </a:bodyPr>
+          <a:lstStyle/>
+          <a:p>
+            <a:pPr algn="ctr"/>
+            <a:r>
+              <a:rPr lang="ja-JP" altLang="en-US" dirty="0"/>
+              <a:t>色彩強度</a:t>
+            </a:r>
+            <a:r>
+              <a:rPr kumimoji="1" lang="ja-JP" altLang="en-US" dirty="0"/>
+              <a:t>の数値の分布</a:t>
+            </a:r>
+          </a:p>
+        </p:txBody>
+      </p:sp>
+    </p:spTree>
+    <p:extLst>
+      <p:ext uri="{BB962C8B-B14F-4D97-AF65-F5344CB8AC3E}">
+        <p14:creationId xmlns:p14="http://schemas.microsoft.com/office/powerpoint/2010/main" val="3121510921"/>
+      </p:ext>
+    </p:extLst>
+  </p:cSld>
+  <p:clrMapOvr>
+    <a:masterClrMapping/>
+  </p:clrMapOvr>
+</p:sld>
+</file>
+
+<file path=ppt/slides/slide32.xml><?xml version="1.0" encoding="utf-8"?>
+<p:sld xmlns:a="http://schemas.openxmlformats.org/drawingml/2006/main" xmlns:r="http://schemas.openxmlformats.org/officeDocument/2006/relationships" xmlns:p="http://schemas.openxmlformats.org/presentationml/2006/main">
+  <p:cSld>
+    <p:spTree>
+      <p:nvGrpSpPr>
+        <p:cNvPr id="1" name=""/>
+        <p:cNvGrpSpPr/>
+        <p:nvPr/>
+      </p:nvGrpSpPr>
+      <p:grpSpPr>
+        <a:xfrm>
+          <a:off x="0" y="0"/>
+          <a:ext cx="0" cy="0"/>
+          <a:chOff x="0" y="0"/>
+          <a:chExt cx="0" cy="0"/>
+        </a:xfrm>
+      </p:grpSpPr>
+      <p:pic>
+        <p:nvPicPr>
+          <p:cNvPr id="2" name="図 1">
+            <a:extLst>
+              <a:ext uri="{FF2B5EF4-FFF2-40B4-BE49-F238E27FC236}">
+                <a16:creationId xmlns:a16="http://schemas.microsoft.com/office/drawing/2014/main" id="{160F5F46-CB67-4854-A3D0-7DCE55EA5325}"/>
+              </a:ext>
+            </a:extLst>
+          </p:cNvPr>
+          <p:cNvPicPr>
+            <a:picLocks noChangeAspect="1"/>
+          </p:cNvPicPr>
+          <p:nvPr/>
+        </p:nvPicPr>
+        <p:blipFill>
+          <a:blip r:embed="rId2"/>
+          <a:stretch>
+            <a:fillRect/>
+          </a:stretch>
+        </p:blipFill>
+        <p:spPr>
+          <a:xfrm>
+            <a:off x="2052222" y="1100831"/>
+            <a:ext cx="5353746" cy="5457316"/>
+          </a:xfrm>
+          <a:prstGeom prst="rect">
+            <a:avLst/>
+          </a:prstGeom>
+        </p:spPr>
+      </p:pic>
+      <p:sp>
+        <p:nvSpPr>
+          <p:cNvPr id="3" name="テキスト ボックス 2">
+            <a:extLst>
+              <a:ext uri="{FF2B5EF4-FFF2-40B4-BE49-F238E27FC236}">
+                <a16:creationId xmlns:a16="http://schemas.microsoft.com/office/drawing/2014/main" id="{A5DCD37C-9A39-4F26-ADD6-49CF0C16F32D}"/>
+              </a:ext>
+            </a:extLst>
+          </p:cNvPr>
+          <p:cNvSpPr txBox="1"/>
+          <p:nvPr/>
+        </p:nvSpPr>
+        <p:spPr>
+          <a:xfrm>
+            <a:off x="2897336" y="553376"/>
+            <a:ext cx="3663518" cy="369332"/>
+          </a:xfrm>
+          <a:prstGeom prst="rect">
+            <a:avLst/>
+          </a:prstGeom>
+          <a:noFill/>
+        </p:spPr>
+        <p:txBody>
+          <a:bodyPr wrap="square" rtlCol="0">
+            <a:spAutoFit/>
+          </a:bodyPr>
+          <a:lstStyle/>
+          <a:p>
+            <a:pPr algn="ctr"/>
+            <a:r>
+              <a:rPr lang="ja-JP" altLang="en-US" dirty="0"/>
+              <a:t>正規化、標準化なし</a:t>
+            </a:r>
+            <a:endParaRPr lang="en-US" altLang="ja-JP" dirty="0"/>
+          </a:p>
+        </p:txBody>
+      </p:sp>
+    </p:spTree>
+    <p:extLst>
+      <p:ext uri="{BB962C8B-B14F-4D97-AF65-F5344CB8AC3E}">
+        <p14:creationId xmlns:p14="http://schemas.microsoft.com/office/powerpoint/2010/main" val="2984585539"/>
+      </p:ext>
+    </p:extLst>
+  </p:cSld>
+  <p:clrMapOvr>
+    <a:masterClrMapping/>
+  </p:clrMapOvr>
+</p:sld>
+</file>
+
+<file path=ppt/slides/slide33.xml><?xml version="1.0" encoding="utf-8"?>
+<p:sld xmlns:a="http://schemas.openxmlformats.org/drawingml/2006/main" xmlns:r="http://schemas.openxmlformats.org/officeDocument/2006/relationships" xmlns:p="http://schemas.openxmlformats.org/presentationml/2006/main">
+  <p:cSld>
+    <p:spTree>
+      <p:nvGrpSpPr>
+        <p:cNvPr id="1" name=""/>
+        <p:cNvGrpSpPr/>
+        <p:nvPr/>
+      </p:nvGrpSpPr>
+      <p:grpSpPr>
+        <a:xfrm>
+          <a:off x="0" y="0"/>
+          <a:ext cx="0" cy="0"/>
+          <a:chOff x="0" y="0"/>
+          <a:chExt cx="0" cy="0"/>
+        </a:xfrm>
+      </p:grpSpPr>
+      <p:sp>
+        <p:nvSpPr>
+          <p:cNvPr id="4" name="テキスト ボックス 3">
+            <a:extLst>
+              <a:ext uri="{FF2B5EF4-FFF2-40B4-BE49-F238E27FC236}">
+                <a16:creationId xmlns:a16="http://schemas.microsoft.com/office/drawing/2014/main" id="{54EA601C-28E8-42AE-88E8-785FF7D48E68}"/>
+              </a:ext>
+            </a:extLst>
+          </p:cNvPr>
+          <p:cNvSpPr txBox="1"/>
+          <p:nvPr/>
+        </p:nvSpPr>
+        <p:spPr>
+          <a:xfrm>
+            <a:off x="1100914" y="491232"/>
+            <a:ext cx="3663518" cy="369332"/>
+          </a:xfrm>
+          <a:prstGeom prst="rect">
+            <a:avLst/>
+          </a:prstGeom>
+          <a:noFill/>
+        </p:spPr>
+        <p:txBody>
+          <a:bodyPr wrap="square" rtlCol="0">
+            <a:spAutoFit/>
+          </a:bodyPr>
+          <a:lstStyle/>
+          <a:p>
+            <a:pPr algn="ctr"/>
+            <a:r>
+              <a:rPr lang="en-US" altLang="ja-JP" dirty="0"/>
+              <a:t>z-score</a:t>
+            </a:r>
+            <a:r>
+              <a:rPr lang="ja-JP" altLang="en-US" dirty="0"/>
+              <a:t> </a:t>
+            </a:r>
+            <a:r>
+              <a:rPr lang="en-US" altLang="ja-JP" dirty="0"/>
+              <a:t>normalization(</a:t>
+            </a:r>
+            <a:r>
+              <a:rPr lang="ja-JP" altLang="en-US" dirty="0"/>
+              <a:t>標準化</a:t>
+            </a:r>
+            <a:r>
+              <a:rPr lang="en-US" altLang="ja-JP" dirty="0"/>
+              <a:t>)</a:t>
+            </a:r>
+          </a:p>
+        </p:txBody>
+      </p:sp>
+      <p:sp>
+        <p:nvSpPr>
+          <p:cNvPr id="5" name="テキスト ボックス 4">
+            <a:extLst>
+              <a:ext uri="{FF2B5EF4-FFF2-40B4-BE49-F238E27FC236}">
+                <a16:creationId xmlns:a16="http://schemas.microsoft.com/office/drawing/2014/main" id="{1655C72D-CC71-4A0A-BD24-F9DC39215F5F}"/>
+              </a:ext>
+            </a:extLst>
+          </p:cNvPr>
+          <p:cNvSpPr txBox="1"/>
+          <p:nvPr/>
+        </p:nvSpPr>
+        <p:spPr>
+          <a:xfrm>
+            <a:off x="7085943" y="455721"/>
+            <a:ext cx="3663518" cy="369332"/>
+          </a:xfrm>
+          <a:prstGeom prst="rect">
+            <a:avLst/>
+          </a:prstGeom>
+          <a:noFill/>
+        </p:spPr>
+        <p:txBody>
+          <a:bodyPr wrap="square" rtlCol="0">
+            <a:spAutoFit/>
+          </a:bodyPr>
+          <a:lstStyle/>
+          <a:p>
+            <a:pPr algn="ctr"/>
+            <a:r>
+              <a:rPr lang="en-US" altLang="ja-JP" dirty="0"/>
+              <a:t>Min-Max</a:t>
+            </a:r>
+            <a:r>
+              <a:rPr lang="ja-JP" altLang="en-US" dirty="0"/>
+              <a:t> </a:t>
+            </a:r>
+            <a:r>
+              <a:rPr lang="en-US" altLang="ja-JP" dirty="0"/>
+              <a:t>normalization(</a:t>
+            </a:r>
+            <a:r>
+              <a:rPr lang="ja-JP" altLang="en-US" dirty="0"/>
+              <a:t>正規化</a:t>
+            </a:r>
+            <a:r>
+              <a:rPr lang="en-US" altLang="ja-JP" dirty="0"/>
+              <a:t>)</a:t>
+            </a:r>
+          </a:p>
+        </p:txBody>
+      </p:sp>
+      <p:pic>
+        <p:nvPicPr>
+          <p:cNvPr id="6" name="図 5">
+            <a:extLst>
+              <a:ext uri="{FF2B5EF4-FFF2-40B4-BE49-F238E27FC236}">
+                <a16:creationId xmlns:a16="http://schemas.microsoft.com/office/drawing/2014/main" id="{FC82473E-176C-46FE-8D13-F6644A033753}"/>
+              </a:ext>
+            </a:extLst>
+          </p:cNvPr>
+          <p:cNvPicPr>
+            <a:picLocks noChangeAspect="1"/>
+          </p:cNvPicPr>
+          <p:nvPr/>
+        </p:nvPicPr>
+        <p:blipFill>
+          <a:blip r:embed="rId2"/>
+          <a:stretch>
+            <a:fillRect/>
+          </a:stretch>
+        </p:blipFill>
+        <p:spPr>
+          <a:xfrm>
+            <a:off x="567428" y="860564"/>
+            <a:ext cx="5528572" cy="5676438"/>
+          </a:xfrm>
+          <a:prstGeom prst="rect">
+            <a:avLst/>
+          </a:prstGeom>
+        </p:spPr>
+      </p:pic>
+      <p:pic>
+        <p:nvPicPr>
+          <p:cNvPr id="7" name="図 6">
+            <a:extLst>
+              <a:ext uri="{FF2B5EF4-FFF2-40B4-BE49-F238E27FC236}">
+                <a16:creationId xmlns:a16="http://schemas.microsoft.com/office/drawing/2014/main" id="{7059806B-213D-4CBF-B9CC-FA879A4BB210}"/>
+              </a:ext>
+            </a:extLst>
+          </p:cNvPr>
+          <p:cNvPicPr>
+            <a:picLocks noChangeAspect="1"/>
+          </p:cNvPicPr>
+          <p:nvPr/>
+        </p:nvPicPr>
+        <p:blipFill>
+          <a:blip r:embed="rId3"/>
+          <a:stretch>
+            <a:fillRect/>
+          </a:stretch>
+        </p:blipFill>
+        <p:spPr>
+          <a:xfrm>
+            <a:off x="6407275" y="860563"/>
+            <a:ext cx="5511425" cy="5676437"/>
+          </a:xfrm>
+          <a:prstGeom prst="rect">
+            <a:avLst/>
+          </a:prstGeom>
+        </p:spPr>
+      </p:pic>
+    </p:spTree>
+    <p:extLst>
+      <p:ext uri="{BB962C8B-B14F-4D97-AF65-F5344CB8AC3E}">
+        <p14:creationId xmlns:p14="http://schemas.microsoft.com/office/powerpoint/2010/main" val="1371398847"/>
+      </p:ext>
+    </p:extLst>
+  </p:cSld>
+  <p:clrMapOvr>
+    <a:masterClrMapping/>
+  </p:clrMapOvr>
+</p:sld>
+</file>
+
+<file path=ppt/slides/slide34.xml><?xml version="1.0" encoding="utf-8"?>
+<p:sld xmlns:a="http://schemas.openxmlformats.org/drawingml/2006/main" xmlns:r="http://schemas.openxmlformats.org/officeDocument/2006/relationships" xmlns:p="http://schemas.openxmlformats.org/presentationml/2006/main">
+  <p:cSld>
+    <p:spTree>
+      <p:nvGrpSpPr>
+        <p:cNvPr id="1" name=""/>
+        <p:cNvGrpSpPr/>
+        <p:nvPr/>
+      </p:nvGrpSpPr>
+      <p:grpSpPr>
+        <a:xfrm>
+          <a:off x="0" y="0"/>
+          <a:ext cx="0" cy="0"/>
+          <a:chOff x="0" y="0"/>
+          <a:chExt cx="0" cy="0"/>
+        </a:xfrm>
+      </p:grpSpPr>
+      <p:sp>
+        <p:nvSpPr>
+          <p:cNvPr id="2" name="テキスト ボックス 1">
+            <a:extLst>
+              <a:ext uri="{FF2B5EF4-FFF2-40B4-BE49-F238E27FC236}">
+                <a16:creationId xmlns:a16="http://schemas.microsoft.com/office/drawing/2014/main" id="{48B3CEC1-6EDC-4227-8AC1-3DF350EA8A50}"/>
+              </a:ext>
+            </a:extLst>
+          </p:cNvPr>
+          <p:cNvSpPr txBox="1"/>
+          <p:nvPr/>
+        </p:nvSpPr>
+        <p:spPr>
+          <a:xfrm>
+            <a:off x="559294" y="523782"/>
+            <a:ext cx="8043168" cy="3139321"/>
+          </a:xfrm>
+          <a:prstGeom prst="rect">
+            <a:avLst/>
+          </a:prstGeom>
+          <a:noFill/>
+        </p:spPr>
+        <p:txBody>
+          <a:bodyPr wrap="square" rtlCol="0">
+            <a:spAutoFit/>
+          </a:bodyPr>
+          <a:lstStyle/>
+          <a:p>
+            <a:r>
+              <a:rPr lang="ja-JP" altLang="en-US" dirty="0"/>
+              <a:t>全データ中の特徴量データとラベルデータを学習用と評価用に分ける</a:t>
+            </a:r>
+            <a:endParaRPr lang="en-US" altLang="ja-JP" dirty="0"/>
+          </a:p>
+          <a:p>
+            <a:endParaRPr kumimoji="1" lang="en-US" altLang="ja-JP" dirty="0"/>
+          </a:p>
+          <a:p>
+            <a:r>
+              <a:rPr lang="ja-JP" altLang="en-US" dirty="0"/>
+              <a:t>全サンプル数</a:t>
+            </a:r>
+            <a:r>
+              <a:rPr lang="en-US" altLang="ja-JP" dirty="0"/>
+              <a:t>: 178</a:t>
+            </a:r>
+          </a:p>
+          <a:p>
+            <a:endParaRPr kumimoji="1" lang="en-US" altLang="ja-JP" dirty="0"/>
+          </a:p>
+          <a:p>
+            <a:r>
+              <a:rPr lang="ja-JP" altLang="en-US" dirty="0"/>
+              <a:t>評価用にするサンプルの割合</a:t>
+            </a:r>
+            <a:r>
+              <a:rPr lang="en-US" altLang="ja-JP" dirty="0"/>
+              <a:t>: 40%(72</a:t>
+            </a:r>
+            <a:r>
+              <a:rPr lang="ja-JP" altLang="en-US" dirty="0"/>
+              <a:t>個</a:t>
+            </a:r>
+            <a:r>
+              <a:rPr lang="en-US" altLang="ja-JP" dirty="0"/>
+              <a:t>)</a:t>
+            </a:r>
+          </a:p>
+          <a:p>
+            <a:endParaRPr kumimoji="1" lang="en-US" altLang="ja-JP" dirty="0"/>
+          </a:p>
+          <a:p>
+            <a:r>
+              <a:rPr kumimoji="1" lang="ja-JP" altLang="en-US" dirty="0"/>
+              <a:t>学習用サンプル数</a:t>
+            </a:r>
+            <a:r>
+              <a:rPr kumimoji="1" lang="en-US" altLang="ja-JP" dirty="0"/>
+              <a:t>: 106</a:t>
+            </a:r>
+            <a:r>
+              <a:rPr kumimoji="1" lang="ja-JP" altLang="en-US" dirty="0"/>
+              <a:t>個</a:t>
+            </a:r>
+            <a:endParaRPr kumimoji="1" lang="en-US" altLang="ja-JP" dirty="0"/>
+          </a:p>
+          <a:p>
+            <a:endParaRPr lang="en-US" altLang="ja-JP" dirty="0"/>
+          </a:p>
+          <a:p>
+            <a:r>
+              <a:rPr kumimoji="1" lang="ja-JP" altLang="en-US" dirty="0"/>
+              <a:t>等級</a:t>
+            </a:r>
+            <a:r>
+              <a:rPr kumimoji="1" lang="en-US" altLang="ja-JP" dirty="0"/>
+              <a:t>1</a:t>
+            </a:r>
+            <a:r>
+              <a:rPr kumimoji="1" lang="ja-JP" altLang="en-US" dirty="0"/>
+              <a:t>の学習サンプル数</a:t>
+            </a:r>
+            <a:r>
+              <a:rPr kumimoji="1" lang="en-US" altLang="ja-JP" dirty="0"/>
+              <a:t>: 31</a:t>
+            </a:r>
+          </a:p>
+          <a:p>
+            <a:r>
+              <a:rPr lang="ja-JP" altLang="en-US" dirty="0"/>
+              <a:t>等級</a:t>
+            </a:r>
+            <a:r>
+              <a:rPr lang="en-US" altLang="ja-JP" dirty="0"/>
+              <a:t>2</a:t>
+            </a:r>
+            <a:r>
+              <a:rPr lang="ja-JP" altLang="en-US" dirty="0"/>
+              <a:t>の学習サンプル数</a:t>
+            </a:r>
+            <a:r>
+              <a:rPr lang="en-US" altLang="ja-JP" dirty="0"/>
+              <a:t>: 45</a:t>
+            </a:r>
+          </a:p>
+          <a:p>
+            <a:r>
+              <a:rPr lang="ja-JP" altLang="en-US" dirty="0"/>
+              <a:t>等級</a:t>
+            </a:r>
+            <a:r>
+              <a:rPr lang="en-US" altLang="ja-JP" dirty="0"/>
+              <a:t>3</a:t>
+            </a:r>
+            <a:r>
+              <a:rPr lang="ja-JP" altLang="en-US" dirty="0"/>
+              <a:t>の学習サンプル数</a:t>
+            </a:r>
+            <a:r>
+              <a:rPr lang="en-US" altLang="ja-JP" dirty="0"/>
+              <a:t>: 30</a:t>
+            </a:r>
+          </a:p>
+        </p:txBody>
+      </p:sp>
+    </p:spTree>
+    <p:extLst>
+      <p:ext uri="{BB962C8B-B14F-4D97-AF65-F5344CB8AC3E}">
+        <p14:creationId xmlns:p14="http://schemas.microsoft.com/office/powerpoint/2010/main" val="710520280"/>
+      </p:ext>
+    </p:extLst>
+  </p:cSld>
+  <p:clrMapOvr>
+    <a:masterClrMapping/>
+  </p:clrMapOvr>
+</p:sld>
+</file>
+
+<file path=ppt/slides/slide35.xml><?xml version="1.0" encoding="utf-8"?>
+<p:sld xmlns:a="http://schemas.openxmlformats.org/drawingml/2006/main" xmlns:r="http://schemas.openxmlformats.org/officeDocument/2006/relationships" xmlns:p="http://schemas.openxmlformats.org/presentationml/2006/main">
+  <p:cSld>
+    <p:spTree>
+      <p:nvGrpSpPr>
+        <p:cNvPr id="1" name=""/>
+        <p:cNvGrpSpPr/>
+        <p:nvPr/>
+      </p:nvGrpSpPr>
+      <p:grpSpPr>
+        <a:xfrm>
+          <a:off x="0" y="0"/>
+          <a:ext cx="0" cy="0"/>
+          <a:chOff x="0" y="0"/>
+          <a:chExt cx="0" cy="0"/>
+        </a:xfrm>
+      </p:grpSpPr>
+      <p:pic>
+        <p:nvPicPr>
+          <p:cNvPr id="2" name="図 1">
+            <a:extLst>
+              <a:ext uri="{FF2B5EF4-FFF2-40B4-BE49-F238E27FC236}">
+                <a16:creationId xmlns:a16="http://schemas.microsoft.com/office/drawing/2014/main" id="{7817860D-FF17-4195-A30C-2697BD6E1661}"/>
+              </a:ext>
+            </a:extLst>
+          </p:cNvPr>
+          <p:cNvPicPr>
+            <a:picLocks noChangeAspect="1"/>
+          </p:cNvPicPr>
+          <p:nvPr/>
+        </p:nvPicPr>
+        <p:blipFill>
+          <a:blip r:embed="rId2"/>
+          <a:stretch>
+            <a:fillRect/>
+          </a:stretch>
+        </p:blipFill>
+        <p:spPr>
+          <a:xfrm>
+            <a:off x="669235" y="0"/>
+            <a:ext cx="10853530" cy="6858000"/>
+          </a:xfrm>
+          <a:prstGeom prst="rect">
+            <a:avLst/>
+          </a:prstGeom>
+        </p:spPr>
+      </p:pic>
+    </p:spTree>
+    <p:extLst>
+      <p:ext uri="{BB962C8B-B14F-4D97-AF65-F5344CB8AC3E}">
+        <p14:creationId xmlns:p14="http://schemas.microsoft.com/office/powerpoint/2010/main" val="2880462461"/>
+      </p:ext>
+    </p:extLst>
+  </p:cSld>
+  <p:clrMapOvr>
+    <a:masterClrMapping/>
+  </p:clrMapOvr>
+</p:sld>
+</file>
+
+<file path=ppt/slides/slide36.xml><?xml version="1.0" encoding="utf-8"?>
+<p:sld xmlns:a="http://schemas.openxmlformats.org/drawingml/2006/main" xmlns:r="http://schemas.openxmlformats.org/officeDocument/2006/relationships" xmlns:p="http://schemas.openxmlformats.org/presentationml/2006/main">
+  <p:cSld>
+    <p:spTree>
+      <p:nvGrpSpPr>
+        <p:cNvPr id="1" name=""/>
+        <p:cNvGrpSpPr/>
+        <p:nvPr/>
+      </p:nvGrpSpPr>
+      <p:grpSpPr>
+        <a:xfrm>
+          <a:off x="0" y="0"/>
+          <a:ext cx="0" cy="0"/>
+          <a:chOff x="0" y="0"/>
+          <a:chExt cx="0" cy="0"/>
+        </a:xfrm>
+      </p:grpSpPr>
+      <p:sp>
+        <p:nvSpPr>
+          <p:cNvPr id="2" name="テキスト ボックス 1">
+            <a:extLst>
+              <a:ext uri="{FF2B5EF4-FFF2-40B4-BE49-F238E27FC236}">
+                <a16:creationId xmlns:a16="http://schemas.microsoft.com/office/drawing/2014/main" id="{EEAB12D8-62F1-46B8-9BB8-CC7229C54BA4}"/>
+              </a:ext>
+            </a:extLst>
+          </p:cNvPr>
+          <p:cNvSpPr txBox="1"/>
+          <p:nvPr/>
+        </p:nvSpPr>
+        <p:spPr>
+          <a:xfrm>
+            <a:off x="230821" y="266330"/>
+            <a:ext cx="8043168" cy="2862322"/>
+          </a:xfrm>
+          <a:prstGeom prst="rect">
+            <a:avLst/>
+          </a:prstGeom>
+          <a:noFill/>
+        </p:spPr>
+        <p:txBody>
+          <a:bodyPr wrap="square" rtlCol="0">
+            <a:spAutoFit/>
+          </a:bodyPr>
+          <a:lstStyle/>
+          <a:p>
+            <a:r>
+              <a:rPr lang="en-US" altLang="ja-JP" dirty="0"/>
+              <a:t>SVM(Support</a:t>
+            </a:r>
+            <a:r>
+              <a:rPr lang="ja-JP" altLang="en-US" dirty="0"/>
+              <a:t> </a:t>
+            </a:r>
+            <a:r>
+              <a:rPr lang="en-US" altLang="ja-JP" dirty="0"/>
+              <a:t>Vector</a:t>
+            </a:r>
+            <a:r>
+              <a:rPr lang="ja-JP" altLang="en-US" dirty="0"/>
+              <a:t> </a:t>
+            </a:r>
+            <a:r>
+              <a:rPr lang="en-US" altLang="ja-JP" dirty="0"/>
+              <a:t>Machine)</a:t>
+            </a:r>
+            <a:r>
+              <a:rPr lang="ja-JP" altLang="en-US" dirty="0"/>
+              <a:t>によるクラス分類</a:t>
+            </a:r>
+            <a:endParaRPr lang="en-US" altLang="ja-JP" dirty="0"/>
+          </a:p>
+          <a:p>
+            <a:endParaRPr lang="en-US" altLang="ja-JP" dirty="0"/>
+          </a:p>
+          <a:p>
+            <a:r>
+              <a:rPr lang="en-US" altLang="ja-JP" dirty="0"/>
+              <a:t>Linear SVC(SVM Classification)</a:t>
+            </a:r>
+          </a:p>
+          <a:p>
+            <a:endParaRPr lang="en-US" altLang="ja-JP" dirty="0"/>
+          </a:p>
+          <a:p>
+            <a:r>
+              <a:rPr lang="ja-JP" altLang="en-US" dirty="0"/>
+              <a:t>データ数がそれほど多くない場合にまず使用される手法</a:t>
+            </a:r>
+            <a:endParaRPr lang="en-US" altLang="ja-JP" dirty="0"/>
+          </a:p>
+          <a:p>
+            <a:endParaRPr lang="en-US" altLang="ja-JP" dirty="0"/>
+          </a:p>
+          <a:p>
+            <a:r>
+              <a:rPr lang="ja-JP" altLang="en-US" dirty="0"/>
+              <a:t>サンプル数が</a:t>
+            </a:r>
+            <a:r>
+              <a:rPr lang="en-US" altLang="ja-JP" dirty="0"/>
+              <a:t>50</a:t>
+            </a:r>
+            <a:r>
+              <a:rPr lang="ja-JP" altLang="en-US" dirty="0"/>
+              <a:t>以上</a:t>
+            </a:r>
+            <a:endParaRPr lang="en-US" altLang="ja-JP" dirty="0"/>
+          </a:p>
+          <a:p>
+            <a:r>
+              <a:rPr lang="ja-JP" altLang="en-US" dirty="0"/>
+              <a:t>カテゴリの予測</a:t>
+            </a:r>
+            <a:endParaRPr lang="en-US" altLang="ja-JP" dirty="0"/>
+          </a:p>
+          <a:p>
+            <a:r>
+              <a:rPr lang="ja-JP" altLang="en-US" dirty="0"/>
+              <a:t>各サンプルにラベルあり</a:t>
+            </a:r>
+            <a:endParaRPr lang="en-US" altLang="ja-JP" dirty="0"/>
+          </a:p>
+          <a:p>
+            <a:r>
+              <a:rPr lang="ja-JP" altLang="en-US" dirty="0"/>
+              <a:t>サンプル数が</a:t>
+            </a:r>
+            <a:r>
+              <a:rPr lang="en-US" altLang="ja-JP" dirty="0"/>
+              <a:t>10</a:t>
+            </a:r>
+            <a:r>
+              <a:rPr lang="ja-JP" altLang="en-US" dirty="0"/>
+              <a:t>万以下</a:t>
+            </a:r>
+            <a:endParaRPr lang="en-US" altLang="ja-JP" dirty="0"/>
+          </a:p>
+        </p:txBody>
+      </p:sp>
+    </p:spTree>
+    <p:extLst>
+      <p:ext uri="{BB962C8B-B14F-4D97-AF65-F5344CB8AC3E}">
+        <p14:creationId xmlns:p14="http://schemas.microsoft.com/office/powerpoint/2010/main" val="152233154"/>
+      </p:ext>
+    </p:extLst>
+  </p:cSld>
+  <p:clrMapOvr>
+    <a:masterClrMapping/>
+  </p:clrMapOvr>
+</p:sld>
+</file>
+
+<file path=ppt/slides/slide37.xml><?xml version="1.0" encoding="utf-8"?>
+<p:sld xmlns:a="http://schemas.openxmlformats.org/drawingml/2006/main" xmlns:r="http://schemas.openxmlformats.org/officeDocument/2006/relationships" xmlns:p="http://schemas.openxmlformats.org/presentationml/2006/main">
+  <p:cSld>
+    <p:spTree>
+      <p:nvGrpSpPr>
+        <p:cNvPr id="1" name=""/>
+        <p:cNvGrpSpPr/>
+        <p:nvPr/>
+      </p:nvGrpSpPr>
+      <p:grpSpPr>
+        <a:xfrm>
+          <a:off x="0" y="0"/>
+          <a:ext cx="0" cy="0"/>
+          <a:chOff x="0" y="0"/>
+          <a:chExt cx="0" cy="0"/>
+        </a:xfrm>
+      </p:grpSpPr>
+      <p:pic>
+        <p:nvPicPr>
+          <p:cNvPr id="2" name="図 1">
+            <a:extLst>
+              <a:ext uri="{FF2B5EF4-FFF2-40B4-BE49-F238E27FC236}">
+                <a16:creationId xmlns:a16="http://schemas.microsoft.com/office/drawing/2014/main" id="{97D3B495-5120-4F41-9AFE-C6D1AE3613B4}"/>
+              </a:ext>
+            </a:extLst>
+          </p:cNvPr>
+          <p:cNvPicPr>
+            <a:picLocks noChangeAspect="1"/>
+          </p:cNvPicPr>
+          <p:nvPr/>
+        </p:nvPicPr>
+        <p:blipFill>
+          <a:blip r:embed="rId2"/>
+          <a:stretch>
+            <a:fillRect/>
+          </a:stretch>
+        </p:blipFill>
+        <p:spPr>
+          <a:xfrm>
+            <a:off x="0" y="433680"/>
+            <a:ext cx="12192000" cy="6328004"/>
+          </a:xfrm>
+          <a:prstGeom prst="rect">
+            <a:avLst/>
+          </a:prstGeom>
+        </p:spPr>
+      </p:pic>
+    </p:spTree>
+    <p:extLst>
+      <p:ext uri="{BB962C8B-B14F-4D97-AF65-F5344CB8AC3E}">
+        <p14:creationId xmlns:p14="http://schemas.microsoft.com/office/powerpoint/2010/main" val="1394891381"/>
+      </p:ext>
+    </p:extLst>
+  </p:cSld>
+  <p:clrMapOvr>
+    <a:masterClrMapping/>
+  </p:clrMapOvr>
+</p:sld>
+</file>
+
+<file path=ppt/slides/slide38.xml><?xml version="1.0" encoding="utf-8"?>
+<p:sld xmlns:a="http://schemas.openxmlformats.org/drawingml/2006/main" xmlns:r="http://schemas.openxmlformats.org/officeDocument/2006/relationships" xmlns:p="http://schemas.openxmlformats.org/presentationml/2006/main">
+  <p:cSld>
+    <p:spTree>
+      <p:nvGrpSpPr>
+        <p:cNvPr id="1" name=""/>
+        <p:cNvGrpSpPr/>
+        <p:nvPr/>
+      </p:nvGrpSpPr>
+      <p:grpSpPr>
+        <a:xfrm>
+          <a:off x="0" y="0"/>
+          <a:ext cx="0" cy="0"/>
+          <a:chOff x="0" y="0"/>
+          <a:chExt cx="0" cy="0"/>
+        </a:xfrm>
+      </p:grpSpPr>
+      <p:pic>
+        <p:nvPicPr>
+          <p:cNvPr id="2" name="図 1">
+            <a:extLst>
+              <a:ext uri="{FF2B5EF4-FFF2-40B4-BE49-F238E27FC236}">
+                <a16:creationId xmlns:a16="http://schemas.microsoft.com/office/drawing/2014/main" id="{777C7FE2-84D3-4706-B312-E3CE6DDDFDA7}"/>
+              </a:ext>
+            </a:extLst>
+          </p:cNvPr>
+          <p:cNvPicPr>
+            <a:picLocks noChangeAspect="1"/>
+          </p:cNvPicPr>
+          <p:nvPr/>
+        </p:nvPicPr>
+        <p:blipFill>
+          <a:blip r:embed="rId2"/>
+          <a:stretch>
+            <a:fillRect/>
+          </a:stretch>
+        </p:blipFill>
+        <p:spPr>
+          <a:xfrm>
+            <a:off x="0" y="90629"/>
+            <a:ext cx="12192000" cy="6676741"/>
+          </a:xfrm>
+          <a:prstGeom prst="rect">
+            <a:avLst/>
+          </a:prstGeom>
+        </p:spPr>
+      </p:pic>
+    </p:spTree>
+    <p:extLst>
+      <p:ext uri="{BB962C8B-B14F-4D97-AF65-F5344CB8AC3E}">
+        <p14:creationId xmlns:p14="http://schemas.microsoft.com/office/powerpoint/2010/main" val="2148729704"/>
+      </p:ext>
+    </p:extLst>
+  </p:cSld>
+  <p:clrMapOvr>
+    <a:masterClrMapping/>
+  </p:clrMapOvr>
+</p:sld>
+</file>
+
+<file path=ppt/slides/slide39.xml><?xml version="1.0" encoding="utf-8"?>
+<p:sld xmlns:a="http://schemas.openxmlformats.org/drawingml/2006/main" xmlns:r="http://schemas.openxmlformats.org/officeDocument/2006/relationships" xmlns:p="http://schemas.openxmlformats.org/presentationml/2006/main">
+  <p:cSld>
+    <p:spTree>
+      <p:nvGrpSpPr>
+        <p:cNvPr id="1" name=""/>
+        <p:cNvGrpSpPr/>
+        <p:nvPr/>
+      </p:nvGrpSpPr>
+      <p:grpSpPr>
+        <a:xfrm>
+          <a:off x="0" y="0"/>
+          <a:ext cx="0" cy="0"/>
+          <a:chOff x="0" y="0"/>
+          <a:chExt cx="0" cy="0"/>
+        </a:xfrm>
+      </p:grpSpPr>
+      <p:pic>
+        <p:nvPicPr>
+          <p:cNvPr id="2" name="図 1">
+            <a:extLst>
+              <a:ext uri="{FF2B5EF4-FFF2-40B4-BE49-F238E27FC236}">
+                <a16:creationId xmlns:a16="http://schemas.microsoft.com/office/drawing/2014/main" id="{A660A389-A497-4493-ADD3-EBF6DFBC86EC}"/>
+              </a:ext>
+            </a:extLst>
+          </p:cNvPr>
+          <p:cNvPicPr>
+            <a:picLocks noChangeAspect="1"/>
+          </p:cNvPicPr>
+          <p:nvPr/>
+        </p:nvPicPr>
+        <p:blipFill>
+          <a:blip r:embed="rId2"/>
+          <a:stretch>
+            <a:fillRect/>
+          </a:stretch>
+        </p:blipFill>
+        <p:spPr>
+          <a:xfrm>
+            <a:off x="0" y="110027"/>
+            <a:ext cx="12192000" cy="6637945"/>
+          </a:xfrm>
+          <a:prstGeom prst="rect">
+            <a:avLst/>
+          </a:prstGeom>
+        </p:spPr>
+      </p:pic>
+    </p:spTree>
+    <p:extLst>
+      <p:ext uri="{BB962C8B-B14F-4D97-AF65-F5344CB8AC3E}">
+        <p14:creationId xmlns:p14="http://schemas.microsoft.com/office/powerpoint/2010/main" val="889676904"/>
       </p:ext>
     </p:extLst>
   </p:cSld>
@@ -11395,6 +13522,546 @@
     <p:extLst>
       <p:ext uri="{BB962C8B-B14F-4D97-AF65-F5344CB8AC3E}">
         <p14:creationId xmlns:p14="http://schemas.microsoft.com/office/powerpoint/2010/main" val="1176667343"/>
+      </p:ext>
+    </p:extLst>
+  </p:cSld>
+  <p:clrMapOvr>
+    <a:masterClrMapping/>
+  </p:clrMapOvr>
+</p:sld>
+</file>
+
+<file path=ppt/slides/slide40.xml><?xml version="1.0" encoding="utf-8"?>
+<p:sld xmlns:a="http://schemas.openxmlformats.org/drawingml/2006/main" xmlns:r="http://schemas.openxmlformats.org/officeDocument/2006/relationships" xmlns:p="http://schemas.openxmlformats.org/presentationml/2006/main">
+  <p:cSld>
+    <p:spTree>
+      <p:nvGrpSpPr>
+        <p:cNvPr id="1" name=""/>
+        <p:cNvGrpSpPr/>
+        <p:nvPr/>
+      </p:nvGrpSpPr>
+      <p:grpSpPr>
+        <a:xfrm>
+          <a:off x="0" y="0"/>
+          <a:ext cx="0" cy="0"/>
+          <a:chOff x="0" y="0"/>
+          <a:chExt cx="0" cy="0"/>
+        </a:xfrm>
+      </p:grpSpPr>
+      <p:pic>
+        <p:nvPicPr>
+          <p:cNvPr id="3" name="図 2">
+            <a:extLst>
+              <a:ext uri="{FF2B5EF4-FFF2-40B4-BE49-F238E27FC236}">
+                <a16:creationId xmlns:a16="http://schemas.microsoft.com/office/drawing/2014/main" id="{B9CF1523-A560-4E37-9E4F-CA9B369B8375}"/>
+              </a:ext>
+            </a:extLst>
+          </p:cNvPr>
+          <p:cNvPicPr>
+            <a:picLocks noChangeAspect="1"/>
+          </p:cNvPicPr>
+          <p:nvPr/>
+        </p:nvPicPr>
+        <p:blipFill>
+          <a:blip r:embed="rId2">
+            <a:extLst>
+              <a:ext uri="{28A0092B-C50C-407E-A947-70E740481C1C}">
+                <a14:useLocalDpi xmlns:a14="http://schemas.microsoft.com/office/drawing/2010/main" val="0"/>
+              </a:ext>
+            </a:extLst>
+          </a:blip>
+          <a:stretch>
+            <a:fillRect/>
+          </a:stretch>
+        </p:blipFill>
+        <p:spPr>
+          <a:xfrm>
+            <a:off x="2908717" y="174978"/>
+            <a:ext cx="7155800" cy="6508044"/>
+          </a:xfrm>
+          <a:prstGeom prst="rect">
+            <a:avLst/>
+          </a:prstGeom>
+        </p:spPr>
+      </p:pic>
+    </p:spTree>
+    <p:extLst>
+      <p:ext uri="{BB962C8B-B14F-4D97-AF65-F5344CB8AC3E}">
+        <p14:creationId xmlns:p14="http://schemas.microsoft.com/office/powerpoint/2010/main" val="433209441"/>
+      </p:ext>
+    </p:extLst>
+  </p:cSld>
+  <p:clrMapOvr>
+    <a:masterClrMapping/>
+  </p:clrMapOvr>
+</p:sld>
+</file>
+
+<file path=ppt/slides/slide41.xml><?xml version="1.0" encoding="utf-8"?>
+<p:sld xmlns:a="http://schemas.openxmlformats.org/drawingml/2006/main" xmlns:r="http://schemas.openxmlformats.org/officeDocument/2006/relationships" xmlns:p="http://schemas.openxmlformats.org/presentationml/2006/main">
+  <p:cSld>
+    <p:spTree>
+      <p:nvGrpSpPr>
+        <p:cNvPr id="1" name=""/>
+        <p:cNvGrpSpPr/>
+        <p:nvPr/>
+      </p:nvGrpSpPr>
+      <p:grpSpPr>
+        <a:xfrm>
+          <a:off x="0" y="0"/>
+          <a:ext cx="0" cy="0"/>
+          <a:chOff x="0" y="0"/>
+          <a:chExt cx="0" cy="0"/>
+        </a:xfrm>
+      </p:grpSpPr>
+      <p:sp>
+        <p:nvSpPr>
+          <p:cNvPr id="2" name="テキスト ボックス 1">
+            <a:extLst>
+              <a:ext uri="{FF2B5EF4-FFF2-40B4-BE49-F238E27FC236}">
+                <a16:creationId xmlns:a16="http://schemas.microsoft.com/office/drawing/2014/main" id="{3A2A7CE7-FA82-421F-AD3F-3B8010F92C35}"/>
+              </a:ext>
+            </a:extLst>
+          </p:cNvPr>
+          <p:cNvSpPr txBox="1"/>
+          <p:nvPr/>
+        </p:nvSpPr>
+        <p:spPr>
+          <a:xfrm>
+            <a:off x="381740" y="204186"/>
+            <a:ext cx="8210902" cy="830997"/>
+          </a:xfrm>
+          <a:prstGeom prst="rect">
+            <a:avLst/>
+          </a:prstGeom>
+          <a:noFill/>
+        </p:spPr>
+        <p:txBody>
+          <a:bodyPr wrap="none" rtlCol="0">
+            <a:spAutoFit/>
+          </a:bodyPr>
+          <a:lstStyle/>
+          <a:p>
+            <a:r>
+              <a:rPr lang="en-US" altLang="ja-JP" sz="2400" dirty="0"/>
+              <a:t>KNN(K</a:t>
+            </a:r>
+            <a:r>
+              <a:rPr lang="ja-JP" altLang="en-US" sz="2400" dirty="0"/>
+              <a:t> </a:t>
+            </a:r>
+            <a:r>
+              <a:rPr lang="en-US" altLang="ja-JP" sz="2400" dirty="0"/>
+              <a:t>Nearest</a:t>
+            </a:r>
+            <a:r>
+              <a:rPr lang="ja-JP" altLang="en-US" sz="2400" dirty="0"/>
+              <a:t> </a:t>
+            </a:r>
+            <a:r>
+              <a:rPr lang="en-US" altLang="ja-JP" sz="2400" dirty="0"/>
+              <a:t>Neighbor)</a:t>
+            </a:r>
+            <a:r>
+              <a:rPr lang="ja-JP" altLang="en-US" sz="2400" dirty="0"/>
+              <a:t>でモデルを構築して等級を予測</a:t>
+            </a:r>
+            <a:endParaRPr lang="en-US" altLang="ja-JP" sz="2400" dirty="0"/>
+          </a:p>
+          <a:p>
+            <a:r>
+              <a:rPr lang="en-US" altLang="ja-JP" sz="2400" dirty="0" err="1"/>
+              <a:t>Scikit</a:t>
+            </a:r>
+            <a:r>
+              <a:rPr lang="en-US" altLang="ja-JP" sz="2400" dirty="0"/>
+              <a:t> learn</a:t>
+            </a:r>
+            <a:r>
+              <a:rPr lang="ja-JP" altLang="en-US" sz="2400" dirty="0"/>
+              <a:t>の</a:t>
+            </a:r>
+            <a:r>
+              <a:rPr lang="en-US" altLang="ja-JP" sz="2400" dirty="0" err="1"/>
+              <a:t>KNeighborClassification</a:t>
+            </a:r>
+            <a:r>
+              <a:rPr lang="ja-JP" altLang="en-US" sz="2400" dirty="0"/>
+              <a:t>クラスを使用</a:t>
+            </a:r>
+            <a:endParaRPr lang="en-US" altLang="ja-JP" sz="2400" dirty="0"/>
+          </a:p>
+        </p:txBody>
+      </p:sp>
+      <p:pic>
+        <p:nvPicPr>
+          <p:cNvPr id="3" name="図 2">
+            <a:extLst>
+              <a:ext uri="{FF2B5EF4-FFF2-40B4-BE49-F238E27FC236}">
+                <a16:creationId xmlns:a16="http://schemas.microsoft.com/office/drawing/2014/main" id="{B0670E5D-CA97-42A3-BD63-18B02F9E0227}"/>
+              </a:ext>
+            </a:extLst>
+          </p:cNvPr>
+          <p:cNvPicPr>
+            <a:picLocks noChangeAspect="1"/>
+          </p:cNvPicPr>
+          <p:nvPr/>
+        </p:nvPicPr>
+        <p:blipFill>
+          <a:blip r:embed="rId2"/>
+          <a:stretch>
+            <a:fillRect/>
+          </a:stretch>
+        </p:blipFill>
+        <p:spPr>
+          <a:xfrm>
+            <a:off x="533817" y="1589103"/>
+            <a:ext cx="6244406" cy="4714320"/>
+          </a:xfrm>
+          <a:prstGeom prst="rect">
+            <a:avLst/>
+          </a:prstGeom>
+        </p:spPr>
+      </p:pic>
+      <p:sp>
+        <p:nvSpPr>
+          <p:cNvPr id="4" name="テキスト ボックス 3">
+            <a:extLst>
+              <a:ext uri="{FF2B5EF4-FFF2-40B4-BE49-F238E27FC236}">
+                <a16:creationId xmlns:a16="http://schemas.microsoft.com/office/drawing/2014/main" id="{94458A79-7B82-47C6-8782-C871F6901CB5}"/>
+              </a:ext>
+            </a:extLst>
+          </p:cNvPr>
+          <p:cNvSpPr txBox="1"/>
+          <p:nvPr/>
+        </p:nvSpPr>
+        <p:spPr>
+          <a:xfrm>
+            <a:off x="7448365" y="2095130"/>
+            <a:ext cx="4314548" cy="2031325"/>
+          </a:xfrm>
+          <a:prstGeom prst="rect">
+            <a:avLst/>
+          </a:prstGeom>
+          <a:noFill/>
+        </p:spPr>
+        <p:txBody>
+          <a:bodyPr wrap="square" rtlCol="0">
+            <a:spAutoFit/>
+          </a:bodyPr>
+          <a:lstStyle/>
+          <a:p>
+            <a:r>
+              <a:rPr kumimoji="1" lang="en-US" altLang="ja-JP" dirty="0"/>
+              <a:t>K</a:t>
+            </a:r>
+            <a:r>
+              <a:rPr kumimoji="1" lang="ja-JP" altLang="en-US" dirty="0"/>
+              <a:t>の値を</a:t>
+            </a:r>
+            <a:r>
+              <a:rPr kumimoji="1" lang="en-US" altLang="ja-JP" dirty="0"/>
+              <a:t>1</a:t>
+            </a:r>
+            <a:r>
+              <a:rPr kumimoji="1" lang="ja-JP" altLang="en-US" dirty="0"/>
+              <a:t>から増やしていき、予測精度の変化を可視化。</a:t>
+            </a:r>
+            <a:endParaRPr kumimoji="1" lang="en-US" altLang="ja-JP" dirty="0"/>
+          </a:p>
+          <a:p>
+            <a:endParaRPr lang="en-US" altLang="ja-JP" dirty="0"/>
+          </a:p>
+          <a:p>
+            <a:r>
+              <a:rPr kumimoji="1" lang="ja-JP" altLang="en-US" dirty="0"/>
+              <a:t>最大は、</a:t>
+            </a:r>
+            <a:r>
+              <a:rPr kumimoji="1" lang="en-US" altLang="ja-JP" dirty="0"/>
+              <a:t>K=31</a:t>
+            </a:r>
+            <a:r>
+              <a:rPr kumimoji="1" lang="ja-JP" altLang="en-US" dirty="0"/>
+              <a:t>の時の</a:t>
+            </a:r>
+            <a:r>
+              <a:rPr kumimoji="1" lang="en-US" altLang="ja-JP" dirty="0"/>
+              <a:t>76%</a:t>
+            </a:r>
+          </a:p>
+          <a:p>
+            <a:endParaRPr lang="en-US" altLang="ja-JP" dirty="0"/>
+          </a:p>
+          <a:p>
+            <a:r>
+              <a:rPr lang="ja-JP" altLang="en-US" dirty="0"/>
+              <a:t>学習データに対して特に前処理をしない場合</a:t>
+            </a:r>
+            <a:endParaRPr kumimoji="1" lang="ja-JP" altLang="en-US" dirty="0"/>
+          </a:p>
+        </p:txBody>
+      </p:sp>
+    </p:spTree>
+    <p:extLst>
+      <p:ext uri="{BB962C8B-B14F-4D97-AF65-F5344CB8AC3E}">
+        <p14:creationId xmlns:p14="http://schemas.microsoft.com/office/powerpoint/2010/main" val="1314416784"/>
+      </p:ext>
+    </p:extLst>
+  </p:cSld>
+  <p:clrMapOvr>
+    <a:masterClrMapping/>
+  </p:clrMapOvr>
+</p:sld>
+</file>
+
+<file path=ppt/slides/slide42.xml><?xml version="1.0" encoding="utf-8"?>
+<p:sld xmlns:a="http://schemas.openxmlformats.org/drawingml/2006/main" xmlns:r="http://schemas.openxmlformats.org/officeDocument/2006/relationships" xmlns:p="http://schemas.openxmlformats.org/presentationml/2006/main">
+  <p:cSld>
+    <p:spTree>
+      <p:nvGrpSpPr>
+        <p:cNvPr id="1" name=""/>
+        <p:cNvGrpSpPr/>
+        <p:nvPr/>
+      </p:nvGrpSpPr>
+      <p:grpSpPr>
+        <a:xfrm>
+          <a:off x="0" y="0"/>
+          <a:ext cx="0" cy="0"/>
+          <a:chOff x="0" y="0"/>
+          <a:chExt cx="0" cy="0"/>
+        </a:xfrm>
+      </p:grpSpPr>
+      <p:sp>
+        <p:nvSpPr>
+          <p:cNvPr id="2" name="テキスト ボックス 1">
+            <a:extLst>
+              <a:ext uri="{FF2B5EF4-FFF2-40B4-BE49-F238E27FC236}">
+                <a16:creationId xmlns:a16="http://schemas.microsoft.com/office/drawing/2014/main" id="{3A2A7CE7-FA82-421F-AD3F-3B8010F92C35}"/>
+              </a:ext>
+            </a:extLst>
+          </p:cNvPr>
+          <p:cNvSpPr txBox="1"/>
+          <p:nvPr/>
+        </p:nvSpPr>
+        <p:spPr>
+          <a:xfrm>
+            <a:off x="381740" y="204186"/>
+            <a:ext cx="8210902" cy="830997"/>
+          </a:xfrm>
+          <a:prstGeom prst="rect">
+            <a:avLst/>
+          </a:prstGeom>
+          <a:noFill/>
+        </p:spPr>
+        <p:txBody>
+          <a:bodyPr wrap="none" rtlCol="0">
+            <a:spAutoFit/>
+          </a:bodyPr>
+          <a:lstStyle/>
+          <a:p>
+            <a:r>
+              <a:rPr lang="en-US" altLang="ja-JP" sz="2400" dirty="0"/>
+              <a:t>KNN(K</a:t>
+            </a:r>
+            <a:r>
+              <a:rPr lang="ja-JP" altLang="en-US" sz="2400" dirty="0"/>
+              <a:t> </a:t>
+            </a:r>
+            <a:r>
+              <a:rPr lang="en-US" altLang="ja-JP" sz="2400" dirty="0"/>
+              <a:t>Nearest</a:t>
+            </a:r>
+            <a:r>
+              <a:rPr lang="ja-JP" altLang="en-US" sz="2400" dirty="0"/>
+              <a:t> </a:t>
+            </a:r>
+            <a:r>
+              <a:rPr lang="en-US" altLang="ja-JP" sz="2400" dirty="0"/>
+              <a:t>Neighbor)</a:t>
+            </a:r>
+            <a:r>
+              <a:rPr lang="ja-JP" altLang="en-US" sz="2400" dirty="0"/>
+              <a:t>でモデルを構築して等級を予測</a:t>
+            </a:r>
+            <a:endParaRPr lang="en-US" altLang="ja-JP" sz="2400" dirty="0"/>
+          </a:p>
+          <a:p>
+            <a:r>
+              <a:rPr lang="en-US" altLang="ja-JP" sz="2400" dirty="0" err="1"/>
+              <a:t>Scikit</a:t>
+            </a:r>
+            <a:r>
+              <a:rPr lang="en-US" altLang="ja-JP" sz="2400" dirty="0"/>
+              <a:t> learn</a:t>
+            </a:r>
+            <a:r>
+              <a:rPr lang="ja-JP" altLang="en-US" sz="2400" dirty="0"/>
+              <a:t>の</a:t>
+            </a:r>
+            <a:r>
+              <a:rPr lang="en-US" altLang="ja-JP" sz="2400" dirty="0" err="1"/>
+              <a:t>KNeighborClassification</a:t>
+            </a:r>
+            <a:r>
+              <a:rPr lang="ja-JP" altLang="en-US" sz="2400" dirty="0"/>
+              <a:t>クラスを使用</a:t>
+            </a:r>
+            <a:endParaRPr lang="en-US" altLang="ja-JP" sz="2400" dirty="0"/>
+          </a:p>
+        </p:txBody>
+      </p:sp>
+      <p:sp>
+        <p:nvSpPr>
+          <p:cNvPr id="4" name="テキスト ボックス 3">
+            <a:extLst>
+              <a:ext uri="{FF2B5EF4-FFF2-40B4-BE49-F238E27FC236}">
+                <a16:creationId xmlns:a16="http://schemas.microsoft.com/office/drawing/2014/main" id="{94458A79-7B82-47C6-8782-C871F6901CB5}"/>
+              </a:ext>
+            </a:extLst>
+          </p:cNvPr>
+          <p:cNvSpPr txBox="1"/>
+          <p:nvPr/>
+        </p:nvSpPr>
+        <p:spPr>
+          <a:xfrm>
+            <a:off x="7448365" y="2095130"/>
+            <a:ext cx="4314548" cy="3416320"/>
+          </a:xfrm>
+          <a:prstGeom prst="rect">
+            <a:avLst/>
+          </a:prstGeom>
+          <a:noFill/>
+        </p:spPr>
+        <p:txBody>
+          <a:bodyPr wrap="square" rtlCol="0">
+            <a:spAutoFit/>
+          </a:bodyPr>
+          <a:lstStyle/>
+          <a:p>
+            <a:r>
+              <a:rPr kumimoji="1" lang="en-US" altLang="ja-JP" dirty="0"/>
+              <a:t>K</a:t>
+            </a:r>
+            <a:r>
+              <a:rPr kumimoji="1" lang="ja-JP" altLang="en-US" dirty="0"/>
+              <a:t>の値を</a:t>
+            </a:r>
+            <a:r>
+              <a:rPr kumimoji="1" lang="en-US" altLang="ja-JP" dirty="0"/>
+              <a:t>1</a:t>
+            </a:r>
+            <a:r>
+              <a:rPr kumimoji="1" lang="ja-JP" altLang="en-US" dirty="0"/>
+              <a:t>から増やしていき、予測精度の変化を可視化。</a:t>
+            </a:r>
+            <a:endParaRPr kumimoji="1" lang="en-US" altLang="ja-JP" dirty="0"/>
+          </a:p>
+          <a:p>
+            <a:endParaRPr lang="en-US" altLang="ja-JP" dirty="0"/>
+          </a:p>
+          <a:p>
+            <a:r>
+              <a:rPr kumimoji="1" lang="ja-JP" altLang="en-US" dirty="0"/>
+              <a:t>最大は、</a:t>
+            </a:r>
+            <a:r>
+              <a:rPr kumimoji="1" lang="en-US" altLang="ja-JP" dirty="0"/>
+              <a:t>K=20</a:t>
+            </a:r>
+            <a:r>
+              <a:rPr kumimoji="1" lang="ja-JP" altLang="en-US" dirty="0"/>
+              <a:t>の時の</a:t>
+            </a:r>
+            <a:r>
+              <a:rPr kumimoji="1" lang="en-US" altLang="ja-JP" dirty="0"/>
+              <a:t>78%</a:t>
+            </a:r>
+          </a:p>
+          <a:p>
+            <a:endParaRPr lang="en-US" altLang="ja-JP" dirty="0"/>
+          </a:p>
+          <a:p>
+            <a:r>
+              <a:rPr lang="ja-JP" altLang="en-US" dirty="0"/>
+              <a:t>一番判別しやすそうな色彩強度とプロリンに特徴量を絞ったら少しだけ向上</a:t>
+            </a:r>
+            <a:endParaRPr lang="en-US" altLang="ja-JP" dirty="0"/>
+          </a:p>
+          <a:p>
+            <a:endParaRPr lang="en-US" altLang="ja-JP" dirty="0"/>
+          </a:p>
+          <a:p>
+            <a:r>
+              <a:rPr lang="en-US" altLang="ja-JP" dirty="0"/>
+              <a:t>1</a:t>
+            </a:r>
+            <a:r>
+              <a:rPr lang="ja-JP" altLang="en-US" dirty="0"/>
+              <a:t>クラスあたりの学習データが</a:t>
+            </a:r>
+            <a:r>
+              <a:rPr lang="en-US" altLang="ja-JP" dirty="0"/>
+              <a:t>30</a:t>
+            </a:r>
+            <a:r>
+              <a:rPr lang="ja-JP" altLang="en-US" dirty="0"/>
+              <a:t>個前後のため、</a:t>
+            </a:r>
+            <a:r>
+              <a:rPr lang="en-US" altLang="ja-JP" dirty="0"/>
+              <a:t>K</a:t>
+            </a:r>
+            <a:r>
+              <a:rPr lang="ja-JP" altLang="en-US" dirty="0"/>
+              <a:t>が</a:t>
+            </a:r>
+            <a:r>
+              <a:rPr lang="en-US" altLang="ja-JP" dirty="0"/>
+              <a:t>30</a:t>
+            </a:r>
+            <a:r>
+              <a:rPr lang="ja-JP" altLang="en-US" dirty="0"/>
+              <a:t>に近づく程異なるクラスのデータを最近傍で拾いやすくなり、シ精度が悪化するのではないか。</a:t>
+            </a:r>
+            <a:endParaRPr lang="en-US" altLang="ja-JP" dirty="0"/>
+          </a:p>
+        </p:txBody>
+      </p:sp>
+      <p:pic>
+        <p:nvPicPr>
+          <p:cNvPr id="5" name="図 4">
+            <a:extLst>
+              <a:ext uri="{FF2B5EF4-FFF2-40B4-BE49-F238E27FC236}">
+                <a16:creationId xmlns:a16="http://schemas.microsoft.com/office/drawing/2014/main" id="{80A4BE59-100E-4E84-AE04-94FF59E1B6FC}"/>
+              </a:ext>
+            </a:extLst>
+          </p:cNvPr>
+          <p:cNvPicPr>
+            <a:picLocks noChangeAspect="1"/>
+          </p:cNvPicPr>
+          <p:nvPr/>
+        </p:nvPicPr>
+        <p:blipFill>
+          <a:blip r:embed="rId2"/>
+          <a:stretch>
+            <a:fillRect/>
+          </a:stretch>
+        </p:blipFill>
+        <p:spPr>
+          <a:xfrm>
+            <a:off x="621253" y="1482571"/>
+            <a:ext cx="6279088" cy="4795096"/>
+          </a:xfrm>
+          <a:prstGeom prst="rect">
+            <a:avLst/>
+          </a:prstGeom>
+        </p:spPr>
+      </p:pic>
+    </p:spTree>
+    <p:extLst>
+      <p:ext uri="{BB962C8B-B14F-4D97-AF65-F5344CB8AC3E}">
+        <p14:creationId xmlns:p14="http://schemas.microsoft.com/office/powerpoint/2010/main" val="2394394122"/>
       </p:ext>
     </p:extLst>
   </p:cSld>

</xml_diff>